<commit_message>
Wrapping up first pass on 1st slide deck
</commit_message>
<xml_diff>
--- a/Slidedecks_ML/2024_Delphi_NLP_with_ML_Part_1.pptx
+++ b/Slidedecks_ML/2024_Delphi_NLP_with_ML_Part_1.pptx
@@ -12,6 +12,20 @@
     <p:sldId id="260" r:id="rId6"/>
     <p:sldId id="261" r:id="rId7"/>
     <p:sldId id="262" r:id="rId8"/>
+    <p:sldId id="263" r:id="rId9"/>
+    <p:sldId id="272" r:id="rId10"/>
+    <p:sldId id="264" r:id="rId11"/>
+    <p:sldId id="265" r:id="rId12"/>
+    <p:sldId id="267" r:id="rId13"/>
+    <p:sldId id="266" r:id="rId14"/>
+    <p:sldId id="268" r:id="rId15"/>
+    <p:sldId id="274" r:id="rId16"/>
+    <p:sldId id="269" r:id="rId17"/>
+    <p:sldId id="270" r:id="rId18"/>
+    <p:sldId id="271" r:id="rId19"/>
+    <p:sldId id="275" r:id="rId20"/>
+    <p:sldId id="273" r:id="rId21"/>
+    <p:sldId id="276" r:id="rId22"/>
   </p:sldIdLst>
   <p:sldSz cx="12192000" cy="6858000"/>
   <p:notesSz cx="6858000" cy="9144000"/>
@@ -7766,6 +7780,2177 @@
 </p:sld>
 </file>
 
+<file path=ppt/slides/slide10.xml><?xml version="1.0" encoding="utf-8"?>
+<p:sld xmlns:a="http://schemas.openxmlformats.org/drawingml/2006/main" xmlns:r="http://schemas.openxmlformats.org/officeDocument/2006/relationships" xmlns:p="http://schemas.openxmlformats.org/presentationml/2006/main">
+  <p:cSld>
+    <p:spTree>
+      <p:nvGrpSpPr>
+        <p:cNvPr id="1" name="">
+          <a:extLst>
+            <a:ext uri="{FF2B5EF4-FFF2-40B4-BE49-F238E27FC236}">
+              <a16:creationId xmlns:a16="http://schemas.microsoft.com/office/drawing/2014/main" id="{1248DFE6-524C-531F-9E74-7C60E769DEFF}"/>
+            </a:ext>
+          </a:extLst>
+        </p:cNvPr>
+        <p:cNvGrpSpPr/>
+        <p:nvPr/>
+      </p:nvGrpSpPr>
+      <p:grpSpPr>
+        <a:xfrm>
+          <a:off x="0" y="0"/>
+          <a:ext cx="0" cy="0"/>
+          <a:chOff x="0" y="0"/>
+          <a:chExt cx="0" cy="0"/>
+        </a:xfrm>
+      </p:grpSpPr>
+      <p:sp>
+        <p:nvSpPr>
+          <p:cNvPr id="2" name="Title 1">
+            <a:extLst>
+              <a:ext uri="{FF2B5EF4-FFF2-40B4-BE49-F238E27FC236}">
+                <a16:creationId xmlns:a16="http://schemas.microsoft.com/office/drawing/2014/main" id="{297C0CE6-1AB7-A515-A63D-F5339CC6AE0F}"/>
+              </a:ext>
+            </a:extLst>
+          </p:cNvPr>
+          <p:cNvSpPr>
+            <a:spLocks noGrp="1"/>
+          </p:cNvSpPr>
+          <p:nvPr>
+            <p:ph type="title"/>
+          </p:nvPr>
+        </p:nvSpPr>
+        <p:spPr/>
+        <p:txBody>
+          <a:bodyPr/>
+          <a:lstStyle/>
+          <a:p>
+            <a:r>
+              <a:rPr lang="en-US" dirty="0"/>
+              <a:t>What are your guesses?</a:t>
+            </a:r>
+          </a:p>
+        </p:txBody>
+      </p:sp>
+    </p:spTree>
+    <p:extLst>
+      <p:ext uri="{BB962C8B-B14F-4D97-AF65-F5344CB8AC3E}">
+        <p14:creationId xmlns:p14="http://schemas.microsoft.com/office/powerpoint/2010/main" val="2327397498"/>
+      </p:ext>
+    </p:extLst>
+  </p:cSld>
+  <p:clrMapOvr>
+    <a:masterClrMapping/>
+  </p:clrMapOvr>
+</p:sld>
+</file>
+
+<file path=ppt/slides/slide11.xml><?xml version="1.0" encoding="utf-8"?>
+<p:sld xmlns:a="http://schemas.openxmlformats.org/drawingml/2006/main" xmlns:r="http://schemas.openxmlformats.org/officeDocument/2006/relationships" xmlns:p="http://schemas.openxmlformats.org/presentationml/2006/main">
+  <p:cSld>
+    <p:spTree>
+      <p:nvGrpSpPr>
+        <p:cNvPr id="1" name="">
+          <a:extLst>
+            <a:ext uri="{FF2B5EF4-FFF2-40B4-BE49-F238E27FC236}">
+              <a16:creationId xmlns:a16="http://schemas.microsoft.com/office/drawing/2014/main" id="{6B36F32A-47B1-07B3-F89D-0BFD0A2828CC}"/>
+            </a:ext>
+          </a:extLst>
+        </p:cNvPr>
+        <p:cNvGrpSpPr/>
+        <p:nvPr/>
+      </p:nvGrpSpPr>
+      <p:grpSpPr>
+        <a:xfrm>
+          <a:off x="0" y="0"/>
+          <a:ext cx="0" cy="0"/>
+          <a:chOff x="0" y="0"/>
+          <a:chExt cx="0" cy="0"/>
+        </a:xfrm>
+      </p:grpSpPr>
+      <p:sp>
+        <p:nvSpPr>
+          <p:cNvPr id="2" name="Title 1">
+            <a:extLst>
+              <a:ext uri="{FF2B5EF4-FFF2-40B4-BE49-F238E27FC236}">
+                <a16:creationId xmlns:a16="http://schemas.microsoft.com/office/drawing/2014/main" id="{9139053F-3DBE-C7FC-F3C2-19971F4FACE9}"/>
+              </a:ext>
+            </a:extLst>
+          </p:cNvPr>
+          <p:cNvSpPr>
+            <a:spLocks noGrp="1"/>
+          </p:cNvSpPr>
+          <p:nvPr>
+            <p:ph type="title"/>
+          </p:nvPr>
+        </p:nvSpPr>
+        <p:spPr/>
+        <p:txBody>
+          <a:bodyPr/>
+          <a:lstStyle/>
+          <a:p>
+            <a:r>
+              <a:rPr lang="en-US" dirty="0"/>
+              <a:t>What are your guesses?</a:t>
+            </a:r>
+          </a:p>
+        </p:txBody>
+      </p:sp>
+      <p:pic>
+        <p:nvPicPr>
+          <p:cNvPr id="6" name="Content Placeholder 5">
+            <a:extLst>
+              <a:ext uri="{FF2B5EF4-FFF2-40B4-BE49-F238E27FC236}">
+                <a16:creationId xmlns:a16="http://schemas.microsoft.com/office/drawing/2014/main" id="{B5213419-ECFB-AD63-B451-2D7CF211FBE1}"/>
+              </a:ext>
+            </a:extLst>
+          </p:cNvPr>
+          <p:cNvPicPr>
+            <a:picLocks noGrp="1" noChangeAspect="1"/>
+          </p:cNvPicPr>
+          <p:nvPr>
+            <p:ph idx="1"/>
+          </p:nvPr>
+        </p:nvPicPr>
+        <p:blipFill>
+          <a:blip r:embed="rId2"/>
+          <a:stretch>
+            <a:fillRect/>
+          </a:stretch>
+        </p:blipFill>
+        <p:spPr>
+          <a:xfrm>
+            <a:off x="4010973" y="1776941"/>
+            <a:ext cx="3317195" cy="3778250"/>
+          </a:xfrm>
+          <a:prstGeom prst="rect">
+            <a:avLst/>
+          </a:prstGeom>
+          <a:solidFill>
+            <a:srgbClr val="FFFFFF">
+              <a:shade val="85000"/>
+            </a:srgbClr>
+          </a:solidFill>
+          <a:ln w="190500" cap="rnd">
+            <a:solidFill>
+              <a:srgbClr val="FFFFFF"/>
+            </a:solidFill>
+          </a:ln>
+          <a:effectLst>
+            <a:outerShdw blurRad="50000" algn="tl" rotWithShape="0">
+              <a:srgbClr val="000000">
+                <a:alpha val="41000"/>
+              </a:srgbClr>
+            </a:outerShdw>
+          </a:effectLst>
+          <a:scene3d>
+            <a:camera prst="orthographicFront"/>
+            <a:lightRig rig="twoPt" dir="t">
+              <a:rot lat="0" lon="0" rev="7800000"/>
+            </a:lightRig>
+          </a:scene3d>
+          <a:sp3d contourW="6350">
+            <a:bevelT w="50800" h="16510"/>
+            <a:contourClr>
+              <a:srgbClr val="C0C0C0"/>
+            </a:contourClr>
+          </a:sp3d>
+        </p:spPr>
+      </p:pic>
+    </p:spTree>
+    <p:extLst>
+      <p:ext uri="{BB962C8B-B14F-4D97-AF65-F5344CB8AC3E}">
+        <p14:creationId xmlns:p14="http://schemas.microsoft.com/office/powerpoint/2010/main" val="1371163662"/>
+      </p:ext>
+    </p:extLst>
+  </p:cSld>
+  <p:clrMapOvr>
+    <a:masterClrMapping/>
+  </p:clrMapOvr>
+</p:sld>
+</file>
+
+<file path=ppt/slides/slide12.xml><?xml version="1.0" encoding="utf-8"?>
+<p:sld xmlns:a="http://schemas.openxmlformats.org/drawingml/2006/main" xmlns:r="http://schemas.openxmlformats.org/officeDocument/2006/relationships" xmlns:p="http://schemas.openxmlformats.org/presentationml/2006/main">
+  <p:cSld>
+    <p:spTree>
+      <p:nvGrpSpPr>
+        <p:cNvPr id="1" name="">
+          <a:extLst>
+            <a:ext uri="{FF2B5EF4-FFF2-40B4-BE49-F238E27FC236}">
+              <a16:creationId xmlns:a16="http://schemas.microsoft.com/office/drawing/2014/main" id="{10E4BE5B-1403-C9D0-F36F-3713C47B3520}"/>
+            </a:ext>
+          </a:extLst>
+        </p:cNvPr>
+        <p:cNvGrpSpPr/>
+        <p:nvPr/>
+      </p:nvGrpSpPr>
+      <p:grpSpPr>
+        <a:xfrm>
+          <a:off x="0" y="0"/>
+          <a:ext cx="0" cy="0"/>
+          <a:chOff x="0" y="0"/>
+          <a:chExt cx="0" cy="0"/>
+        </a:xfrm>
+      </p:grpSpPr>
+      <p:sp>
+        <p:nvSpPr>
+          <p:cNvPr id="2" name="Title 1">
+            <a:extLst>
+              <a:ext uri="{FF2B5EF4-FFF2-40B4-BE49-F238E27FC236}">
+                <a16:creationId xmlns:a16="http://schemas.microsoft.com/office/drawing/2014/main" id="{C030D9EB-6A70-D4F6-9387-22A153677D5D}"/>
+              </a:ext>
+            </a:extLst>
+          </p:cNvPr>
+          <p:cNvSpPr>
+            <a:spLocks noGrp="1"/>
+          </p:cNvSpPr>
+          <p:nvPr>
+            <p:ph type="title"/>
+          </p:nvPr>
+        </p:nvSpPr>
+        <p:spPr/>
+        <p:txBody>
+          <a:bodyPr>
+            <a:normAutofit/>
+          </a:bodyPr>
+          <a:lstStyle/>
+          <a:p>
+            <a:r>
+              <a:rPr lang="en-US" dirty="0"/>
+              <a:t>Before 2017..</a:t>
+            </a:r>
+          </a:p>
+        </p:txBody>
+      </p:sp>
+      <p:sp>
+        <p:nvSpPr>
+          <p:cNvPr id="3" name="Content Placeholder 2">
+            <a:extLst>
+              <a:ext uri="{FF2B5EF4-FFF2-40B4-BE49-F238E27FC236}">
+                <a16:creationId xmlns:a16="http://schemas.microsoft.com/office/drawing/2014/main" id="{C32F4196-4E97-3097-1D1E-BA7FF2FF243B}"/>
+              </a:ext>
+            </a:extLst>
+          </p:cNvPr>
+          <p:cNvSpPr>
+            <a:spLocks noGrp="1"/>
+          </p:cNvSpPr>
+          <p:nvPr>
+            <p:ph idx="1"/>
+          </p:nvPr>
+        </p:nvSpPr>
+        <p:spPr/>
+        <p:txBody>
+          <a:bodyPr/>
+          <a:lstStyle/>
+          <a:p>
+            <a:r>
+              <a:rPr lang="en-US" dirty="0"/>
+              <a:t>Before 2017, state of the art for statistical language models was called word2vec</a:t>
+            </a:r>
+          </a:p>
+          <a:p>
+            <a:r>
+              <a:rPr lang="en-US" dirty="0"/>
+              <a:t>A downside of this model is that it did not use context to represent words</a:t>
+            </a:r>
+          </a:p>
+          <a:p>
+            <a:r>
+              <a:rPr lang="en-US" dirty="0"/>
+              <a:t>For a word like </a:t>
+            </a:r>
+            <a:r>
+              <a:rPr lang="en-US" b="1" u="sng" dirty="0"/>
+              <a:t>bank</a:t>
+            </a:r>
+            <a:r>
+              <a:rPr lang="en-US" dirty="0"/>
+              <a:t>, the representation would be the same in these:</a:t>
+            </a:r>
+          </a:p>
+          <a:p>
+            <a:endParaRPr lang="en-US" dirty="0"/>
+          </a:p>
+          <a:p>
+            <a:r>
+              <a:rPr lang="en-US" dirty="0"/>
+              <a:t>“I caught several fish by the </a:t>
+            </a:r>
+            <a:r>
+              <a:rPr lang="en-US" b="1" u="sng" dirty="0"/>
+              <a:t>bank</a:t>
+            </a:r>
+            <a:r>
+              <a:rPr lang="en-US" dirty="0"/>
+              <a:t>”</a:t>
+            </a:r>
+          </a:p>
+          <a:p>
+            <a:r>
+              <a:rPr lang="en-US" dirty="0"/>
+              <a:t>“I withdrew my life savings at the </a:t>
+            </a:r>
+            <a:r>
+              <a:rPr lang="en-US" b="1" u="sng" dirty="0"/>
+              <a:t>bank</a:t>
+            </a:r>
+            <a:r>
+              <a:rPr lang="en-US" dirty="0"/>
+              <a:t>”</a:t>
+            </a:r>
+          </a:p>
+        </p:txBody>
+      </p:sp>
+    </p:spTree>
+    <p:extLst>
+      <p:ext uri="{BB962C8B-B14F-4D97-AF65-F5344CB8AC3E}">
+        <p14:creationId xmlns:p14="http://schemas.microsoft.com/office/powerpoint/2010/main" val="808214820"/>
+      </p:ext>
+    </p:extLst>
+  </p:cSld>
+  <p:clrMapOvr>
+    <a:masterClrMapping/>
+  </p:clrMapOvr>
+</p:sld>
+</file>
+
+<file path=ppt/slides/slide13.xml><?xml version="1.0" encoding="utf-8"?>
+<p:sld xmlns:a="http://schemas.openxmlformats.org/drawingml/2006/main" xmlns:r="http://schemas.openxmlformats.org/officeDocument/2006/relationships" xmlns:p="http://schemas.openxmlformats.org/presentationml/2006/main">
+  <p:cSld>
+    <p:spTree>
+      <p:nvGrpSpPr>
+        <p:cNvPr id="1" name=""/>
+        <p:cNvGrpSpPr/>
+        <p:nvPr/>
+      </p:nvGrpSpPr>
+      <p:grpSpPr>
+        <a:xfrm>
+          <a:off x="0" y="0"/>
+          <a:ext cx="0" cy="0"/>
+          <a:chOff x="0" y="0"/>
+          <a:chExt cx="0" cy="0"/>
+        </a:xfrm>
+      </p:grpSpPr>
+      <p:sp>
+        <p:nvSpPr>
+          <p:cNvPr id="2" name="Title 1">
+            <a:extLst>
+              <a:ext uri="{FF2B5EF4-FFF2-40B4-BE49-F238E27FC236}">
+                <a16:creationId xmlns:a16="http://schemas.microsoft.com/office/drawing/2014/main" id="{25852063-F9B0-529B-57F4-8FA15E84713D}"/>
+              </a:ext>
+            </a:extLst>
+          </p:cNvPr>
+          <p:cNvSpPr>
+            <a:spLocks noGrp="1"/>
+          </p:cNvSpPr>
+          <p:nvPr>
+            <p:ph type="title"/>
+          </p:nvPr>
+        </p:nvSpPr>
+        <p:spPr/>
+        <p:txBody>
+          <a:bodyPr>
+            <a:normAutofit/>
+          </a:bodyPr>
+          <a:lstStyle/>
+          <a:p>
+            <a:r>
+              <a:rPr lang="en-US" dirty="0"/>
+              <a:t>2017 continues a series of “breakthrough” moments</a:t>
+            </a:r>
+          </a:p>
+        </p:txBody>
+      </p:sp>
+      <p:pic>
+        <p:nvPicPr>
+          <p:cNvPr id="5" name="Content Placeholder 4">
+            <a:extLst>
+              <a:ext uri="{FF2B5EF4-FFF2-40B4-BE49-F238E27FC236}">
+                <a16:creationId xmlns:a16="http://schemas.microsoft.com/office/drawing/2014/main" id="{7133516F-CAE2-9A67-AA25-F3A2A9C94FD5}"/>
+              </a:ext>
+            </a:extLst>
+          </p:cNvPr>
+          <p:cNvPicPr>
+            <a:picLocks noGrp="1" noChangeAspect="1"/>
+          </p:cNvPicPr>
+          <p:nvPr>
+            <p:ph idx="1"/>
+          </p:nvPr>
+        </p:nvPicPr>
+        <p:blipFill>
+          <a:blip r:embed="rId2"/>
+          <a:stretch>
+            <a:fillRect/>
+          </a:stretch>
+        </p:blipFill>
+        <p:spPr>
+          <a:xfrm>
+            <a:off x="2923706" y="2048934"/>
+            <a:ext cx="4721154" cy="4521200"/>
+          </a:xfrm>
+          <a:prstGeom prst="rect">
+            <a:avLst/>
+          </a:prstGeom>
+          <a:solidFill>
+            <a:srgbClr val="FFFFFF">
+              <a:shade val="85000"/>
+            </a:srgbClr>
+          </a:solidFill>
+          <a:ln w="190500" cap="rnd">
+            <a:solidFill>
+              <a:srgbClr val="FFFFFF"/>
+            </a:solidFill>
+          </a:ln>
+          <a:effectLst>
+            <a:outerShdw blurRad="50000" algn="tl" rotWithShape="0">
+              <a:srgbClr val="000000">
+                <a:alpha val="41000"/>
+              </a:srgbClr>
+            </a:outerShdw>
+          </a:effectLst>
+          <a:scene3d>
+            <a:camera prst="orthographicFront"/>
+            <a:lightRig rig="twoPt" dir="t">
+              <a:rot lat="0" lon="0" rev="7800000"/>
+            </a:lightRig>
+          </a:scene3d>
+          <a:sp3d contourW="6350">
+            <a:bevelT w="50800" h="16510"/>
+            <a:contourClr>
+              <a:srgbClr val="C0C0C0"/>
+            </a:contourClr>
+          </a:sp3d>
+        </p:spPr>
+      </p:pic>
+      <p:sp>
+        <p:nvSpPr>
+          <p:cNvPr id="7" name="Rectangle: Rounded Corners 6">
+            <a:extLst>
+              <a:ext uri="{FF2B5EF4-FFF2-40B4-BE49-F238E27FC236}">
+                <a16:creationId xmlns:a16="http://schemas.microsoft.com/office/drawing/2014/main" id="{A2DC8861-407E-6F3C-C9A1-1544751493A5}"/>
+              </a:ext>
+            </a:extLst>
+          </p:cNvPr>
+          <p:cNvSpPr/>
+          <p:nvPr/>
+        </p:nvSpPr>
+        <p:spPr>
+          <a:xfrm>
+            <a:off x="8060267" y="2658533"/>
+            <a:ext cx="3810000" cy="3575357"/>
+          </a:xfrm>
+          <a:prstGeom prst="roundRect">
+            <a:avLst/>
+          </a:prstGeom>
+        </p:spPr>
+        <p:style>
+          <a:lnRef idx="2">
+            <a:schemeClr val="accent4">
+              <a:shade val="15000"/>
+            </a:schemeClr>
+          </a:lnRef>
+          <a:fillRef idx="1">
+            <a:schemeClr val="accent4"/>
+          </a:fillRef>
+          <a:effectRef idx="0">
+            <a:schemeClr val="accent4"/>
+          </a:effectRef>
+          <a:fontRef idx="minor">
+            <a:schemeClr val="lt1"/>
+          </a:fontRef>
+        </p:style>
+        <p:txBody>
+          <a:bodyPr rtlCol="0" anchor="ctr"/>
+          <a:lstStyle/>
+          <a:p>
+            <a:pPr algn="ctr"/>
+            <a:r>
+              <a:rPr lang="en-US" dirty="0"/>
+              <a:t>What do we mean by attention?</a:t>
+            </a:r>
+          </a:p>
+          <a:p>
+            <a:pPr algn="ctr"/>
+            <a:endParaRPr lang="en-US" dirty="0"/>
+          </a:p>
+          <a:p>
+            <a:pPr algn="ctr"/>
+            <a:r>
+              <a:rPr lang="en-US" dirty="0"/>
+              <a:t>What does this have to do with filling in the blanks for words?</a:t>
+            </a:r>
+          </a:p>
+        </p:txBody>
+      </p:sp>
+    </p:spTree>
+    <p:extLst>
+      <p:ext uri="{BB962C8B-B14F-4D97-AF65-F5344CB8AC3E}">
+        <p14:creationId xmlns:p14="http://schemas.microsoft.com/office/powerpoint/2010/main" val="3097280241"/>
+      </p:ext>
+    </p:extLst>
+  </p:cSld>
+  <p:clrMapOvr>
+    <a:masterClrMapping/>
+  </p:clrMapOvr>
+</p:sld>
+</file>
+
+<file path=ppt/slides/slide14.xml><?xml version="1.0" encoding="utf-8"?>
+<p:sld xmlns:a="http://schemas.openxmlformats.org/drawingml/2006/main" xmlns:r="http://schemas.openxmlformats.org/officeDocument/2006/relationships" xmlns:p="http://schemas.openxmlformats.org/presentationml/2006/main">
+  <p:cSld>
+    <p:spTree>
+      <p:nvGrpSpPr>
+        <p:cNvPr id="1" name="">
+          <a:extLst>
+            <a:ext uri="{FF2B5EF4-FFF2-40B4-BE49-F238E27FC236}">
+              <a16:creationId xmlns:a16="http://schemas.microsoft.com/office/drawing/2014/main" id="{CE899669-9308-B3BF-2963-3C6109068E4A}"/>
+            </a:ext>
+          </a:extLst>
+        </p:cNvPr>
+        <p:cNvGrpSpPr/>
+        <p:nvPr/>
+      </p:nvGrpSpPr>
+      <p:grpSpPr>
+        <a:xfrm>
+          <a:off x="0" y="0"/>
+          <a:ext cx="0" cy="0"/>
+          <a:chOff x="0" y="0"/>
+          <a:chExt cx="0" cy="0"/>
+        </a:xfrm>
+      </p:grpSpPr>
+      <p:sp>
+        <p:nvSpPr>
+          <p:cNvPr id="2" name="Title 1">
+            <a:extLst>
+              <a:ext uri="{FF2B5EF4-FFF2-40B4-BE49-F238E27FC236}">
+                <a16:creationId xmlns:a16="http://schemas.microsoft.com/office/drawing/2014/main" id="{A341CE90-9BCF-C375-E9A3-A5F705BDD0DC}"/>
+              </a:ext>
+            </a:extLst>
+          </p:cNvPr>
+          <p:cNvSpPr>
+            <a:spLocks noGrp="1"/>
+          </p:cNvSpPr>
+          <p:nvPr>
+            <p:ph type="title"/>
+          </p:nvPr>
+        </p:nvSpPr>
+        <p:spPr/>
+        <p:txBody>
+          <a:bodyPr>
+            <a:normAutofit/>
+          </a:bodyPr>
+          <a:lstStyle/>
+          <a:p>
+            <a:r>
+              <a:rPr lang="en-US" dirty="0"/>
+              <a:t>Attention in models (Transformers)</a:t>
+            </a:r>
+          </a:p>
+        </p:txBody>
+      </p:sp>
+      <p:sp>
+        <p:nvSpPr>
+          <p:cNvPr id="3" name="Content Placeholder 2">
+            <a:extLst>
+              <a:ext uri="{FF2B5EF4-FFF2-40B4-BE49-F238E27FC236}">
+                <a16:creationId xmlns:a16="http://schemas.microsoft.com/office/drawing/2014/main" id="{92D5B373-E6C7-047A-EB9B-43DA58394908}"/>
+              </a:ext>
+            </a:extLst>
+          </p:cNvPr>
+          <p:cNvSpPr>
+            <a:spLocks noGrp="1"/>
+          </p:cNvSpPr>
+          <p:nvPr>
+            <p:ph idx="1"/>
+          </p:nvPr>
+        </p:nvSpPr>
+        <p:spPr/>
+        <p:txBody>
+          <a:bodyPr/>
+          <a:lstStyle/>
+          <a:p>
+            <a:endParaRPr lang="en-US" dirty="0"/>
+          </a:p>
+          <a:p>
+            <a:r>
+              <a:rPr lang="en-US" sz="3200" dirty="0"/>
+              <a:t>“I caught several fish by the </a:t>
+            </a:r>
+            <a:r>
+              <a:rPr lang="en-US" sz="3200" b="1" u="sng" dirty="0"/>
+              <a:t>bank</a:t>
+            </a:r>
+            <a:r>
+              <a:rPr lang="en-US" sz="3200" dirty="0"/>
+              <a:t>”</a:t>
+            </a:r>
+          </a:p>
+          <a:p>
+            <a:endParaRPr lang="en-US" dirty="0"/>
+          </a:p>
+          <a:p>
+            <a:endParaRPr lang="en-US" dirty="0"/>
+          </a:p>
+          <a:p>
+            <a:r>
+              <a:rPr lang="en-US" sz="3200" dirty="0"/>
+              <a:t>“I withdrew my life savings at the </a:t>
+            </a:r>
+            <a:r>
+              <a:rPr lang="en-US" sz="3200" b="1" u="sng" dirty="0"/>
+              <a:t>bank</a:t>
+            </a:r>
+            <a:r>
+              <a:rPr lang="en-US" sz="3200" dirty="0"/>
+              <a:t>”</a:t>
+            </a:r>
+          </a:p>
+        </p:txBody>
+      </p:sp>
+      <p:sp>
+        <p:nvSpPr>
+          <p:cNvPr id="7" name="Arrow: Curved Up 6">
+            <a:extLst>
+              <a:ext uri="{FF2B5EF4-FFF2-40B4-BE49-F238E27FC236}">
+                <a16:creationId xmlns:a16="http://schemas.microsoft.com/office/drawing/2014/main" id="{688A563C-3434-FB9C-8403-F2F9FA282175}"/>
+              </a:ext>
+            </a:extLst>
+          </p:cNvPr>
+          <p:cNvSpPr/>
+          <p:nvPr/>
+        </p:nvSpPr>
+        <p:spPr>
+          <a:xfrm>
+            <a:off x="4030133" y="3124200"/>
+            <a:ext cx="5572655" cy="812800"/>
+          </a:xfrm>
+          <a:prstGeom prst="curvedUpArrow">
+            <a:avLst/>
+          </a:prstGeom>
+        </p:spPr>
+        <p:style>
+          <a:lnRef idx="2">
+            <a:schemeClr val="accent1">
+              <a:shade val="15000"/>
+            </a:schemeClr>
+          </a:lnRef>
+          <a:fillRef idx="1">
+            <a:schemeClr val="accent1"/>
+          </a:fillRef>
+          <a:effectRef idx="0">
+            <a:schemeClr val="accent1"/>
+          </a:effectRef>
+          <a:fontRef idx="minor">
+            <a:schemeClr val="lt1"/>
+          </a:fontRef>
+        </p:style>
+        <p:txBody>
+          <a:bodyPr rtlCol="0" anchor="ctr"/>
+          <a:lstStyle/>
+          <a:p>
+            <a:pPr algn="ctr"/>
+            <a:endParaRPr lang="en-US">
+              <a:solidFill>
+                <a:schemeClr val="tx1"/>
+              </a:solidFill>
+            </a:endParaRPr>
+          </a:p>
+        </p:txBody>
+      </p:sp>
+      <p:sp>
+        <p:nvSpPr>
+          <p:cNvPr id="8" name="Arrow: Curved Up 7">
+            <a:extLst>
+              <a:ext uri="{FF2B5EF4-FFF2-40B4-BE49-F238E27FC236}">
+                <a16:creationId xmlns:a16="http://schemas.microsoft.com/office/drawing/2014/main" id="{2A5262AA-E07B-C7FB-C430-AB5A5B5408A6}"/>
+              </a:ext>
+            </a:extLst>
+          </p:cNvPr>
+          <p:cNvSpPr/>
+          <p:nvPr/>
+        </p:nvSpPr>
+        <p:spPr>
+          <a:xfrm>
+            <a:off x="6629400" y="3124200"/>
+            <a:ext cx="2973388" cy="812800"/>
+          </a:xfrm>
+          <a:prstGeom prst="curvedUpArrow">
+            <a:avLst/>
+          </a:prstGeom>
+        </p:spPr>
+        <p:style>
+          <a:lnRef idx="2">
+            <a:schemeClr val="accent1">
+              <a:shade val="15000"/>
+            </a:schemeClr>
+          </a:lnRef>
+          <a:fillRef idx="1">
+            <a:schemeClr val="accent1"/>
+          </a:fillRef>
+          <a:effectRef idx="0">
+            <a:schemeClr val="accent1"/>
+          </a:effectRef>
+          <a:fontRef idx="minor">
+            <a:schemeClr val="lt1"/>
+          </a:fontRef>
+        </p:style>
+        <p:txBody>
+          <a:bodyPr rtlCol="0" anchor="ctr"/>
+          <a:lstStyle/>
+          <a:p>
+            <a:pPr algn="ctr"/>
+            <a:endParaRPr lang="en-US">
+              <a:solidFill>
+                <a:schemeClr val="tx1"/>
+              </a:solidFill>
+            </a:endParaRPr>
+          </a:p>
+        </p:txBody>
+      </p:sp>
+      <p:sp>
+        <p:nvSpPr>
+          <p:cNvPr id="9" name="Arrow: Curved Up 8">
+            <a:extLst>
+              <a:ext uri="{FF2B5EF4-FFF2-40B4-BE49-F238E27FC236}">
+                <a16:creationId xmlns:a16="http://schemas.microsoft.com/office/drawing/2014/main" id="{C36961DC-5E21-124C-9752-5C661E9B4E02}"/>
+              </a:ext>
+            </a:extLst>
+          </p:cNvPr>
+          <p:cNvSpPr/>
+          <p:nvPr/>
+        </p:nvSpPr>
+        <p:spPr>
+          <a:xfrm>
+            <a:off x="4140200" y="4521200"/>
+            <a:ext cx="6112933" cy="812800"/>
+          </a:xfrm>
+          <a:prstGeom prst="curvedUpArrow">
+            <a:avLst/>
+          </a:prstGeom>
+        </p:spPr>
+        <p:style>
+          <a:lnRef idx="2">
+            <a:schemeClr val="accent1">
+              <a:shade val="15000"/>
+            </a:schemeClr>
+          </a:lnRef>
+          <a:fillRef idx="1">
+            <a:schemeClr val="accent1"/>
+          </a:fillRef>
+          <a:effectRef idx="0">
+            <a:schemeClr val="accent1"/>
+          </a:effectRef>
+          <a:fontRef idx="minor">
+            <a:schemeClr val="lt1"/>
+          </a:fontRef>
+        </p:style>
+        <p:txBody>
+          <a:bodyPr rtlCol="0" anchor="ctr"/>
+          <a:lstStyle/>
+          <a:p>
+            <a:pPr algn="ctr"/>
+            <a:endParaRPr lang="en-US">
+              <a:solidFill>
+                <a:schemeClr val="tx1"/>
+              </a:solidFill>
+            </a:endParaRPr>
+          </a:p>
+        </p:txBody>
+      </p:sp>
+      <p:sp>
+        <p:nvSpPr>
+          <p:cNvPr id="10" name="Arrow: Curved Up 9">
+            <a:extLst>
+              <a:ext uri="{FF2B5EF4-FFF2-40B4-BE49-F238E27FC236}">
+                <a16:creationId xmlns:a16="http://schemas.microsoft.com/office/drawing/2014/main" id="{0C0613A3-B61A-DDFA-725F-B9C4A3044A1C}"/>
+              </a:ext>
+            </a:extLst>
+          </p:cNvPr>
+          <p:cNvSpPr/>
+          <p:nvPr/>
+        </p:nvSpPr>
+        <p:spPr>
+          <a:xfrm>
+            <a:off x="6231466" y="4546601"/>
+            <a:ext cx="4021667" cy="812800"/>
+          </a:xfrm>
+          <a:prstGeom prst="curvedUpArrow">
+            <a:avLst/>
+          </a:prstGeom>
+        </p:spPr>
+        <p:style>
+          <a:lnRef idx="2">
+            <a:schemeClr val="accent1">
+              <a:shade val="15000"/>
+            </a:schemeClr>
+          </a:lnRef>
+          <a:fillRef idx="1">
+            <a:schemeClr val="accent1"/>
+          </a:fillRef>
+          <a:effectRef idx="0">
+            <a:schemeClr val="accent1"/>
+          </a:effectRef>
+          <a:fontRef idx="minor">
+            <a:schemeClr val="lt1"/>
+          </a:fontRef>
+        </p:style>
+        <p:txBody>
+          <a:bodyPr rtlCol="0" anchor="ctr"/>
+          <a:lstStyle/>
+          <a:p>
+            <a:pPr algn="ctr"/>
+            <a:endParaRPr lang="en-US">
+              <a:solidFill>
+                <a:schemeClr val="tx1"/>
+              </a:solidFill>
+            </a:endParaRPr>
+          </a:p>
+        </p:txBody>
+      </p:sp>
+      <p:sp>
+        <p:nvSpPr>
+          <p:cNvPr id="11" name="Arrow: Curved Up 10">
+            <a:extLst>
+              <a:ext uri="{FF2B5EF4-FFF2-40B4-BE49-F238E27FC236}">
+                <a16:creationId xmlns:a16="http://schemas.microsoft.com/office/drawing/2014/main" id="{4F315F35-6BCA-7937-B682-696421DE412B}"/>
+              </a:ext>
+            </a:extLst>
+          </p:cNvPr>
+          <p:cNvSpPr/>
+          <p:nvPr/>
+        </p:nvSpPr>
+        <p:spPr>
+          <a:xfrm>
+            <a:off x="7255933" y="4495799"/>
+            <a:ext cx="2973389" cy="812800"/>
+          </a:xfrm>
+          <a:prstGeom prst="curvedUpArrow">
+            <a:avLst/>
+          </a:prstGeom>
+        </p:spPr>
+        <p:style>
+          <a:lnRef idx="2">
+            <a:schemeClr val="accent1">
+              <a:shade val="15000"/>
+            </a:schemeClr>
+          </a:lnRef>
+          <a:fillRef idx="1">
+            <a:schemeClr val="accent1"/>
+          </a:fillRef>
+          <a:effectRef idx="0">
+            <a:schemeClr val="accent1"/>
+          </a:effectRef>
+          <a:fontRef idx="minor">
+            <a:schemeClr val="lt1"/>
+          </a:fontRef>
+        </p:style>
+        <p:txBody>
+          <a:bodyPr rtlCol="0" anchor="ctr"/>
+          <a:lstStyle/>
+          <a:p>
+            <a:pPr algn="ctr"/>
+            <a:endParaRPr lang="en-US">
+              <a:solidFill>
+                <a:schemeClr val="tx1"/>
+              </a:solidFill>
+            </a:endParaRPr>
+          </a:p>
+        </p:txBody>
+      </p:sp>
+      <p:sp>
+        <p:nvSpPr>
+          <p:cNvPr id="12" name="Rectangle: Rounded Corners 11">
+            <a:extLst>
+              <a:ext uri="{FF2B5EF4-FFF2-40B4-BE49-F238E27FC236}">
+                <a16:creationId xmlns:a16="http://schemas.microsoft.com/office/drawing/2014/main" id="{089A545C-50D3-14BA-2C20-35A927785445}"/>
+              </a:ext>
+            </a:extLst>
+          </p:cNvPr>
+          <p:cNvSpPr/>
+          <p:nvPr/>
+        </p:nvSpPr>
+        <p:spPr>
+          <a:xfrm>
+            <a:off x="2973388" y="5547155"/>
+            <a:ext cx="7010400" cy="1185333"/>
+          </a:xfrm>
+          <a:prstGeom prst="roundRect">
+            <a:avLst/>
+          </a:prstGeom>
+        </p:spPr>
+        <p:style>
+          <a:lnRef idx="2">
+            <a:schemeClr val="accent4">
+              <a:shade val="15000"/>
+            </a:schemeClr>
+          </a:lnRef>
+          <a:fillRef idx="1">
+            <a:schemeClr val="accent4"/>
+          </a:fillRef>
+          <a:effectRef idx="0">
+            <a:schemeClr val="accent4"/>
+          </a:effectRef>
+          <a:fontRef idx="minor">
+            <a:schemeClr val="lt1"/>
+          </a:fontRef>
+        </p:style>
+        <p:txBody>
+          <a:bodyPr rtlCol="0" anchor="ctr"/>
+          <a:lstStyle/>
+          <a:p>
+            <a:pPr algn="ctr"/>
+            <a:r>
+              <a:rPr lang="en-US" dirty="0"/>
+              <a:t>Pay attention to these other words…</a:t>
+            </a:r>
+          </a:p>
+          <a:p>
+            <a:pPr algn="ctr"/>
+            <a:r>
+              <a:rPr lang="en-US" dirty="0"/>
+              <a:t>… they are crucial for modeling</a:t>
+            </a:r>
+          </a:p>
+        </p:txBody>
+      </p:sp>
+    </p:spTree>
+    <p:extLst>
+      <p:ext uri="{BB962C8B-B14F-4D97-AF65-F5344CB8AC3E}">
+        <p14:creationId xmlns:p14="http://schemas.microsoft.com/office/powerpoint/2010/main" val="2908137872"/>
+      </p:ext>
+    </p:extLst>
+  </p:cSld>
+  <p:clrMapOvr>
+    <a:masterClrMapping/>
+  </p:clrMapOvr>
+</p:sld>
+</file>
+
+<file path=ppt/slides/slide15.xml><?xml version="1.0" encoding="utf-8"?>
+<p:sld xmlns:a="http://schemas.openxmlformats.org/drawingml/2006/main" xmlns:r="http://schemas.openxmlformats.org/officeDocument/2006/relationships" xmlns:p="http://schemas.openxmlformats.org/presentationml/2006/main">
+  <p:cSld>
+    <p:spTree>
+      <p:nvGrpSpPr>
+        <p:cNvPr id="1" name=""/>
+        <p:cNvGrpSpPr/>
+        <p:nvPr/>
+      </p:nvGrpSpPr>
+      <p:grpSpPr>
+        <a:xfrm>
+          <a:off x="0" y="0"/>
+          <a:ext cx="0" cy="0"/>
+          <a:chOff x="0" y="0"/>
+          <a:chExt cx="0" cy="0"/>
+        </a:xfrm>
+      </p:grpSpPr>
+      <p:sp>
+        <p:nvSpPr>
+          <p:cNvPr id="2" name="Title 1">
+            <a:extLst>
+              <a:ext uri="{FF2B5EF4-FFF2-40B4-BE49-F238E27FC236}">
+                <a16:creationId xmlns:a16="http://schemas.microsoft.com/office/drawing/2014/main" id="{3B918098-9554-3979-A664-8609E1926222}"/>
+              </a:ext>
+            </a:extLst>
+          </p:cNvPr>
+          <p:cNvSpPr>
+            <a:spLocks noGrp="1"/>
+          </p:cNvSpPr>
+          <p:nvPr>
+            <p:ph type="title"/>
+          </p:nvPr>
+        </p:nvSpPr>
+        <p:spPr/>
+        <p:txBody>
+          <a:bodyPr/>
+          <a:lstStyle/>
+          <a:p>
+            <a:r>
+              <a:rPr lang="en-US" dirty="0"/>
+              <a:t>Models and terminology of LLMs</a:t>
+            </a:r>
+          </a:p>
+        </p:txBody>
+      </p:sp>
+      <p:sp>
+        <p:nvSpPr>
+          <p:cNvPr id="3" name="Content Placeholder 2">
+            <a:extLst>
+              <a:ext uri="{FF2B5EF4-FFF2-40B4-BE49-F238E27FC236}">
+                <a16:creationId xmlns:a16="http://schemas.microsoft.com/office/drawing/2014/main" id="{3C447F5A-8F9E-E479-6BE7-C81F638DAB98}"/>
+              </a:ext>
+            </a:extLst>
+          </p:cNvPr>
+          <p:cNvSpPr>
+            <a:spLocks noGrp="1"/>
+          </p:cNvSpPr>
+          <p:nvPr>
+            <p:ph idx="1"/>
+          </p:nvPr>
+        </p:nvSpPr>
+        <p:spPr/>
+        <p:txBody>
+          <a:bodyPr/>
+          <a:lstStyle/>
+          <a:p>
+            <a:r>
+              <a:rPr lang="en-US" dirty="0"/>
+              <a:t>Transformers: Architecture for today’s state of the art LLMs</a:t>
+            </a:r>
+          </a:p>
+          <a:p>
+            <a:r>
+              <a:rPr lang="en-US" dirty="0"/>
+              <a:t>There are many model names/types which are Transformers:</a:t>
+            </a:r>
+          </a:p>
+          <a:p>
+            <a:pPr lvl="1"/>
+            <a:r>
+              <a:rPr lang="en-US" dirty="0"/>
+              <a:t>BERT</a:t>
+            </a:r>
+          </a:p>
+          <a:p>
+            <a:pPr lvl="1"/>
+            <a:r>
+              <a:rPr lang="en-US" dirty="0"/>
+              <a:t>GPT</a:t>
+            </a:r>
+          </a:p>
+          <a:p>
+            <a:pPr lvl="1"/>
+            <a:r>
+              <a:rPr lang="en-US" dirty="0" err="1"/>
+              <a:t>LLaMa</a:t>
+            </a:r>
+            <a:endParaRPr lang="en-US" dirty="0"/>
+          </a:p>
+          <a:p>
+            <a:pPr lvl="1"/>
+            <a:r>
+              <a:rPr lang="en-US" dirty="0"/>
+              <a:t>Vicuna</a:t>
+            </a:r>
+          </a:p>
+          <a:p>
+            <a:pPr lvl="1"/>
+            <a:r>
+              <a:rPr lang="en-US" dirty="0"/>
+              <a:t>Alpaca</a:t>
+            </a:r>
+          </a:p>
+          <a:p>
+            <a:pPr lvl="1"/>
+            <a:r>
+              <a:rPr lang="en-US" dirty="0"/>
+              <a:t>Falcon</a:t>
+            </a:r>
+          </a:p>
+          <a:p>
+            <a:pPr lvl="1"/>
+            <a:r>
+              <a:rPr lang="en-US" dirty="0" err="1"/>
+              <a:t>PaLM</a:t>
+            </a:r>
+            <a:endParaRPr lang="en-US" dirty="0"/>
+          </a:p>
+          <a:p>
+            <a:r>
+              <a:rPr lang="en-US" dirty="0"/>
+              <a:t>We’ll end today orienting to this fast moving ecosystem</a:t>
+            </a:r>
+          </a:p>
+        </p:txBody>
+      </p:sp>
+    </p:spTree>
+    <p:extLst>
+      <p:ext uri="{BB962C8B-B14F-4D97-AF65-F5344CB8AC3E}">
+        <p14:creationId xmlns:p14="http://schemas.microsoft.com/office/powerpoint/2010/main" val="2915614113"/>
+      </p:ext>
+    </p:extLst>
+  </p:cSld>
+  <p:clrMapOvr>
+    <a:masterClrMapping/>
+  </p:clrMapOvr>
+</p:sld>
+</file>
+
+<file path=ppt/slides/slide16.xml><?xml version="1.0" encoding="utf-8"?>
+<p:sld xmlns:a="http://schemas.openxmlformats.org/drawingml/2006/main" xmlns:r="http://schemas.openxmlformats.org/officeDocument/2006/relationships" xmlns:p="http://schemas.openxmlformats.org/presentationml/2006/main">
+  <p:cSld>
+    <p:spTree>
+      <p:nvGrpSpPr>
+        <p:cNvPr id="1" name=""/>
+        <p:cNvGrpSpPr/>
+        <p:nvPr/>
+      </p:nvGrpSpPr>
+      <p:grpSpPr>
+        <a:xfrm>
+          <a:off x="0" y="0"/>
+          <a:ext cx="0" cy="0"/>
+          <a:chOff x="0" y="0"/>
+          <a:chExt cx="0" cy="0"/>
+        </a:xfrm>
+      </p:grpSpPr>
+      <p:sp>
+        <p:nvSpPr>
+          <p:cNvPr id="2" name="Title 1">
+            <a:extLst>
+              <a:ext uri="{FF2B5EF4-FFF2-40B4-BE49-F238E27FC236}">
+                <a16:creationId xmlns:a16="http://schemas.microsoft.com/office/drawing/2014/main" id="{70E8B042-A11E-F188-408F-47F72731F29A}"/>
+              </a:ext>
+            </a:extLst>
+          </p:cNvPr>
+          <p:cNvSpPr>
+            <a:spLocks noGrp="1"/>
+          </p:cNvSpPr>
+          <p:nvPr>
+            <p:ph type="title"/>
+          </p:nvPr>
+        </p:nvSpPr>
+        <p:spPr/>
+        <p:txBody>
+          <a:bodyPr/>
+          <a:lstStyle/>
+          <a:p>
+            <a:r>
+              <a:rPr lang="en-US" dirty="0"/>
+              <a:t>Pre-training vs fine tuning:</a:t>
+            </a:r>
+            <a:br>
+              <a:rPr lang="en-US" dirty="0"/>
+            </a:br>
+            <a:r>
+              <a:rPr lang="en-US" dirty="0"/>
+              <a:t>An imperfect analogy</a:t>
+            </a:r>
+          </a:p>
+        </p:txBody>
+      </p:sp>
+      <p:pic>
+        <p:nvPicPr>
+          <p:cNvPr id="5" name="Content Placeholder 4" descr="Tractor outline">
+            <a:extLst>
+              <a:ext uri="{FF2B5EF4-FFF2-40B4-BE49-F238E27FC236}">
+                <a16:creationId xmlns:a16="http://schemas.microsoft.com/office/drawing/2014/main" id="{D077F6A3-40F5-096B-D001-C36125BBB283}"/>
+              </a:ext>
+            </a:extLst>
+          </p:cNvPr>
+          <p:cNvPicPr>
+            <a:picLocks noGrp="1" noChangeAspect="1"/>
+          </p:cNvPicPr>
+          <p:nvPr>
+            <p:ph idx="1"/>
+          </p:nvPr>
+        </p:nvPicPr>
+        <p:blipFill>
+          <a:blip r:embed="rId2">
+            <a:extLst>
+              <a:ext uri="{28A0092B-C50C-407E-A947-70E740481C1C}">
+                <a14:useLocalDpi xmlns:a14="http://schemas.microsoft.com/office/drawing/2010/main" val="0"/>
+              </a:ext>
+              <a:ext uri="{96DAC541-7B7A-43D3-8B79-37D633B846F1}">
+                <asvg:svgBlip xmlns:asvg="http://schemas.microsoft.com/office/drawing/2016/SVG/main" r:embed="rId3"/>
+              </a:ext>
+            </a:extLst>
+          </a:blip>
+          <a:stretch>
+            <a:fillRect/>
+          </a:stretch>
+        </p:blipFill>
+        <p:spPr>
+          <a:xfrm>
+            <a:off x="8391789" y="4066647"/>
+            <a:ext cx="2909887" cy="2909887"/>
+          </a:xfrm>
+        </p:spPr>
+      </p:pic>
+      <p:pic>
+        <p:nvPicPr>
+          <p:cNvPr id="7" name="Graphic 6" descr="Scooter outline">
+            <a:extLst>
+              <a:ext uri="{FF2B5EF4-FFF2-40B4-BE49-F238E27FC236}">
+                <a16:creationId xmlns:a16="http://schemas.microsoft.com/office/drawing/2014/main" id="{31838F62-AD9C-D3FA-1DAF-BF8B679B9F9F}"/>
+              </a:ext>
+            </a:extLst>
+          </p:cNvPr>
+          <p:cNvPicPr>
+            <a:picLocks noChangeAspect="1"/>
+          </p:cNvPicPr>
+          <p:nvPr/>
+        </p:nvPicPr>
+        <p:blipFill>
+          <a:blip r:embed="rId4">
+            <a:extLst>
+              <a:ext uri="{28A0092B-C50C-407E-A947-70E740481C1C}">
+                <a14:useLocalDpi xmlns:a14="http://schemas.microsoft.com/office/drawing/2010/main" val="0"/>
+              </a:ext>
+              <a:ext uri="{96DAC541-7B7A-43D3-8B79-37D633B846F1}">
+                <asvg:svgBlip xmlns:asvg="http://schemas.microsoft.com/office/drawing/2016/SVG/main" r:embed="rId5"/>
+              </a:ext>
+            </a:extLst>
+          </a:blip>
+          <a:stretch>
+            <a:fillRect/>
+          </a:stretch>
+        </p:blipFill>
+        <p:spPr>
+          <a:xfrm flipH="1">
+            <a:off x="2345265" y="4535709"/>
+            <a:ext cx="2396067" cy="2396067"/>
+          </a:xfrm>
+          <a:prstGeom prst="rect">
+            <a:avLst/>
+          </a:prstGeom>
+        </p:spPr>
+      </p:pic>
+      <p:pic>
+        <p:nvPicPr>
+          <p:cNvPr id="9" name="Graphic 8" descr="Convertible outline">
+            <a:extLst>
+              <a:ext uri="{FF2B5EF4-FFF2-40B4-BE49-F238E27FC236}">
+                <a16:creationId xmlns:a16="http://schemas.microsoft.com/office/drawing/2014/main" id="{D9F81683-50C3-7D55-C1BC-380CF29546E8}"/>
+              </a:ext>
+            </a:extLst>
+          </p:cNvPr>
+          <p:cNvPicPr>
+            <a:picLocks noChangeAspect="1"/>
+          </p:cNvPicPr>
+          <p:nvPr/>
+        </p:nvPicPr>
+        <p:blipFill>
+          <a:blip r:embed="rId6">
+            <a:extLst>
+              <a:ext uri="{28A0092B-C50C-407E-A947-70E740481C1C}">
+                <a14:useLocalDpi xmlns:a14="http://schemas.microsoft.com/office/drawing/2010/main" val="0"/>
+              </a:ext>
+              <a:ext uri="{96DAC541-7B7A-43D3-8B79-37D633B846F1}">
+                <asvg:svgBlip xmlns:asvg="http://schemas.microsoft.com/office/drawing/2016/SVG/main" r:embed="rId7"/>
+              </a:ext>
+            </a:extLst>
+          </a:blip>
+          <a:stretch>
+            <a:fillRect/>
+          </a:stretch>
+        </p:blipFill>
+        <p:spPr>
+          <a:xfrm flipH="1">
+            <a:off x="2277533" y="2031999"/>
+            <a:ext cx="2531533" cy="2531533"/>
+          </a:xfrm>
+          <a:prstGeom prst="rect">
+            <a:avLst/>
+          </a:prstGeom>
+        </p:spPr>
+      </p:pic>
+      <p:pic>
+        <p:nvPicPr>
+          <p:cNvPr id="11" name="Graphic 10" descr="Monster Truck outline">
+            <a:extLst>
+              <a:ext uri="{FF2B5EF4-FFF2-40B4-BE49-F238E27FC236}">
+                <a16:creationId xmlns:a16="http://schemas.microsoft.com/office/drawing/2014/main" id="{A484E74A-23AA-134A-C733-B3313A6F4BF8}"/>
+              </a:ext>
+            </a:extLst>
+          </p:cNvPr>
+          <p:cNvPicPr>
+            <a:picLocks noChangeAspect="1"/>
+          </p:cNvPicPr>
+          <p:nvPr/>
+        </p:nvPicPr>
+        <p:blipFill>
+          <a:blip r:embed="rId8">
+            <a:extLst>
+              <a:ext uri="{28A0092B-C50C-407E-A947-70E740481C1C}">
+                <a14:useLocalDpi xmlns:a14="http://schemas.microsoft.com/office/drawing/2010/main" val="0"/>
+              </a:ext>
+              <a:ext uri="{96DAC541-7B7A-43D3-8B79-37D633B846F1}">
+                <asvg:svgBlip xmlns:asvg="http://schemas.microsoft.com/office/drawing/2016/SVG/main" r:embed="rId9"/>
+              </a:ext>
+            </a:extLst>
+          </a:blip>
+          <a:stretch>
+            <a:fillRect/>
+          </a:stretch>
+        </p:blipFill>
+        <p:spPr>
+          <a:xfrm>
+            <a:off x="8576734" y="2300509"/>
+            <a:ext cx="2235200" cy="2235200"/>
+          </a:xfrm>
+          <a:prstGeom prst="rect">
+            <a:avLst/>
+          </a:prstGeom>
+        </p:spPr>
+      </p:pic>
+      <p:pic>
+        <p:nvPicPr>
+          <p:cNvPr id="13" name="Graphic 12" descr="Cement truck outline">
+            <a:extLst>
+              <a:ext uri="{FF2B5EF4-FFF2-40B4-BE49-F238E27FC236}">
+                <a16:creationId xmlns:a16="http://schemas.microsoft.com/office/drawing/2014/main" id="{0B0BF160-424F-77BD-EB0A-32711BB4660A}"/>
+              </a:ext>
+            </a:extLst>
+          </p:cNvPr>
+          <p:cNvPicPr>
+            <a:picLocks noChangeAspect="1"/>
+          </p:cNvPicPr>
+          <p:nvPr/>
+        </p:nvPicPr>
+        <p:blipFill>
+          <a:blip r:embed="rId10">
+            <a:extLst>
+              <a:ext uri="{28A0092B-C50C-407E-A947-70E740481C1C}">
+                <a14:useLocalDpi xmlns:a14="http://schemas.microsoft.com/office/drawing/2010/main" val="0"/>
+              </a:ext>
+              <a:ext uri="{96DAC541-7B7A-43D3-8B79-37D633B846F1}">
+                <asvg:svgBlip xmlns:asvg="http://schemas.microsoft.com/office/drawing/2016/SVG/main" r:embed="rId11"/>
+              </a:ext>
+            </a:extLst>
+          </a:blip>
+          <a:stretch>
+            <a:fillRect/>
+          </a:stretch>
+        </p:blipFill>
+        <p:spPr>
+          <a:xfrm>
+            <a:off x="5393266" y="4580467"/>
+            <a:ext cx="2414324" cy="2414324"/>
+          </a:xfrm>
+          <a:prstGeom prst="rect">
+            <a:avLst/>
+          </a:prstGeom>
+        </p:spPr>
+      </p:pic>
+    </p:spTree>
+    <p:extLst>
+      <p:ext uri="{BB962C8B-B14F-4D97-AF65-F5344CB8AC3E}">
+        <p14:creationId xmlns:p14="http://schemas.microsoft.com/office/powerpoint/2010/main" val="3042759731"/>
+      </p:ext>
+    </p:extLst>
+  </p:cSld>
+  <p:clrMapOvr>
+    <a:masterClrMapping/>
+  </p:clrMapOvr>
+</p:sld>
+</file>
+
+<file path=ppt/slides/slide17.xml><?xml version="1.0" encoding="utf-8"?>
+<p:sld xmlns:a="http://schemas.openxmlformats.org/drawingml/2006/main" xmlns:r="http://schemas.openxmlformats.org/officeDocument/2006/relationships" xmlns:p="http://schemas.openxmlformats.org/presentationml/2006/main">
+  <p:cSld>
+    <p:spTree>
+      <p:nvGrpSpPr>
+        <p:cNvPr id="1" name="">
+          <a:extLst>
+            <a:ext uri="{FF2B5EF4-FFF2-40B4-BE49-F238E27FC236}">
+              <a16:creationId xmlns:a16="http://schemas.microsoft.com/office/drawing/2014/main" id="{BCDA6FDA-0FEC-6D55-4E06-E55865BA5F62}"/>
+            </a:ext>
+          </a:extLst>
+        </p:cNvPr>
+        <p:cNvGrpSpPr/>
+        <p:nvPr/>
+      </p:nvGrpSpPr>
+      <p:grpSpPr>
+        <a:xfrm>
+          <a:off x="0" y="0"/>
+          <a:ext cx="0" cy="0"/>
+          <a:chOff x="0" y="0"/>
+          <a:chExt cx="0" cy="0"/>
+        </a:xfrm>
+      </p:grpSpPr>
+      <p:sp>
+        <p:nvSpPr>
+          <p:cNvPr id="2" name="Title 1">
+            <a:extLst>
+              <a:ext uri="{FF2B5EF4-FFF2-40B4-BE49-F238E27FC236}">
+                <a16:creationId xmlns:a16="http://schemas.microsoft.com/office/drawing/2014/main" id="{A906A08E-6AB2-5D7A-1D5E-D993ED76A2D7}"/>
+              </a:ext>
+            </a:extLst>
+          </p:cNvPr>
+          <p:cNvSpPr>
+            <a:spLocks noGrp="1"/>
+          </p:cNvSpPr>
+          <p:nvPr>
+            <p:ph type="title"/>
+          </p:nvPr>
+        </p:nvSpPr>
+        <p:spPr/>
+        <p:txBody>
+          <a:bodyPr/>
+          <a:lstStyle/>
+          <a:p>
+            <a:r>
+              <a:rPr lang="en-US" dirty="0"/>
+              <a:t>Pre-training vs fine tuning:</a:t>
+            </a:r>
+            <a:br>
+              <a:rPr lang="en-US" dirty="0"/>
+            </a:br>
+            <a:r>
+              <a:rPr lang="en-US" dirty="0"/>
+              <a:t>An imperfect analogy</a:t>
+            </a:r>
+          </a:p>
+        </p:txBody>
+      </p:sp>
+      <p:pic>
+        <p:nvPicPr>
+          <p:cNvPr id="5" name="Content Placeholder 4" descr="Tractor outline">
+            <a:extLst>
+              <a:ext uri="{FF2B5EF4-FFF2-40B4-BE49-F238E27FC236}">
+                <a16:creationId xmlns:a16="http://schemas.microsoft.com/office/drawing/2014/main" id="{995D91AD-1C4F-3BFA-9DDD-5023CBDA5E88}"/>
+              </a:ext>
+            </a:extLst>
+          </p:cNvPr>
+          <p:cNvPicPr>
+            <a:picLocks noGrp="1" noChangeAspect="1"/>
+          </p:cNvPicPr>
+          <p:nvPr>
+            <p:ph idx="1"/>
+          </p:nvPr>
+        </p:nvPicPr>
+        <p:blipFill>
+          <a:blip r:embed="rId2">
+            <a:extLst>
+              <a:ext uri="{28A0092B-C50C-407E-A947-70E740481C1C}">
+                <a14:useLocalDpi xmlns:a14="http://schemas.microsoft.com/office/drawing/2010/main" val="0"/>
+              </a:ext>
+              <a:ext uri="{96DAC541-7B7A-43D3-8B79-37D633B846F1}">
+                <asvg:svgBlip xmlns:asvg="http://schemas.microsoft.com/office/drawing/2016/SVG/main" r:embed="rId3"/>
+              </a:ext>
+            </a:extLst>
+          </a:blip>
+          <a:stretch>
+            <a:fillRect/>
+          </a:stretch>
+        </p:blipFill>
+        <p:spPr>
+          <a:xfrm>
+            <a:off x="8391789" y="4066647"/>
+            <a:ext cx="2909887" cy="2909887"/>
+          </a:xfrm>
+        </p:spPr>
+      </p:pic>
+      <p:pic>
+        <p:nvPicPr>
+          <p:cNvPr id="7" name="Graphic 6" descr="Scooter outline">
+            <a:extLst>
+              <a:ext uri="{FF2B5EF4-FFF2-40B4-BE49-F238E27FC236}">
+                <a16:creationId xmlns:a16="http://schemas.microsoft.com/office/drawing/2014/main" id="{2C58173B-5A4C-1DF0-B9DE-5B7D0F408EAC}"/>
+              </a:ext>
+            </a:extLst>
+          </p:cNvPr>
+          <p:cNvPicPr>
+            <a:picLocks noChangeAspect="1"/>
+          </p:cNvPicPr>
+          <p:nvPr/>
+        </p:nvPicPr>
+        <p:blipFill>
+          <a:blip r:embed="rId4">
+            <a:extLst>
+              <a:ext uri="{28A0092B-C50C-407E-A947-70E740481C1C}">
+                <a14:useLocalDpi xmlns:a14="http://schemas.microsoft.com/office/drawing/2010/main" val="0"/>
+              </a:ext>
+              <a:ext uri="{96DAC541-7B7A-43D3-8B79-37D633B846F1}">
+                <asvg:svgBlip xmlns:asvg="http://schemas.microsoft.com/office/drawing/2016/SVG/main" r:embed="rId5"/>
+              </a:ext>
+            </a:extLst>
+          </a:blip>
+          <a:stretch>
+            <a:fillRect/>
+          </a:stretch>
+        </p:blipFill>
+        <p:spPr>
+          <a:xfrm flipH="1">
+            <a:off x="2345265" y="4535709"/>
+            <a:ext cx="2396067" cy="2396067"/>
+          </a:xfrm>
+          <a:prstGeom prst="rect">
+            <a:avLst/>
+          </a:prstGeom>
+        </p:spPr>
+      </p:pic>
+      <p:pic>
+        <p:nvPicPr>
+          <p:cNvPr id="9" name="Graphic 8" descr="Convertible outline">
+            <a:extLst>
+              <a:ext uri="{FF2B5EF4-FFF2-40B4-BE49-F238E27FC236}">
+                <a16:creationId xmlns:a16="http://schemas.microsoft.com/office/drawing/2014/main" id="{E9A717D2-69C1-598A-7310-9CE4B3887995}"/>
+              </a:ext>
+            </a:extLst>
+          </p:cNvPr>
+          <p:cNvPicPr>
+            <a:picLocks noChangeAspect="1"/>
+          </p:cNvPicPr>
+          <p:nvPr/>
+        </p:nvPicPr>
+        <p:blipFill>
+          <a:blip r:embed="rId6">
+            <a:extLst>
+              <a:ext uri="{28A0092B-C50C-407E-A947-70E740481C1C}">
+                <a14:useLocalDpi xmlns:a14="http://schemas.microsoft.com/office/drawing/2010/main" val="0"/>
+              </a:ext>
+              <a:ext uri="{96DAC541-7B7A-43D3-8B79-37D633B846F1}">
+                <asvg:svgBlip xmlns:asvg="http://schemas.microsoft.com/office/drawing/2016/SVG/main" r:embed="rId7"/>
+              </a:ext>
+            </a:extLst>
+          </a:blip>
+          <a:stretch>
+            <a:fillRect/>
+          </a:stretch>
+        </p:blipFill>
+        <p:spPr>
+          <a:xfrm flipH="1">
+            <a:off x="2277533" y="2031999"/>
+            <a:ext cx="2531533" cy="2531533"/>
+          </a:xfrm>
+          <a:prstGeom prst="rect">
+            <a:avLst/>
+          </a:prstGeom>
+        </p:spPr>
+      </p:pic>
+      <p:pic>
+        <p:nvPicPr>
+          <p:cNvPr id="11" name="Graphic 10" descr="Monster Truck outline">
+            <a:extLst>
+              <a:ext uri="{FF2B5EF4-FFF2-40B4-BE49-F238E27FC236}">
+                <a16:creationId xmlns:a16="http://schemas.microsoft.com/office/drawing/2014/main" id="{73652AC4-16A7-4BDE-B7F7-01E88BB84DFA}"/>
+              </a:ext>
+            </a:extLst>
+          </p:cNvPr>
+          <p:cNvPicPr>
+            <a:picLocks noChangeAspect="1"/>
+          </p:cNvPicPr>
+          <p:nvPr/>
+        </p:nvPicPr>
+        <p:blipFill>
+          <a:blip r:embed="rId8">
+            <a:extLst>
+              <a:ext uri="{28A0092B-C50C-407E-A947-70E740481C1C}">
+                <a14:useLocalDpi xmlns:a14="http://schemas.microsoft.com/office/drawing/2010/main" val="0"/>
+              </a:ext>
+              <a:ext uri="{96DAC541-7B7A-43D3-8B79-37D633B846F1}">
+                <asvg:svgBlip xmlns:asvg="http://schemas.microsoft.com/office/drawing/2016/SVG/main" r:embed="rId9"/>
+              </a:ext>
+            </a:extLst>
+          </a:blip>
+          <a:stretch>
+            <a:fillRect/>
+          </a:stretch>
+        </p:blipFill>
+        <p:spPr>
+          <a:xfrm>
+            <a:off x="8576734" y="2300509"/>
+            <a:ext cx="2235200" cy="2235200"/>
+          </a:xfrm>
+          <a:prstGeom prst="rect">
+            <a:avLst/>
+          </a:prstGeom>
+        </p:spPr>
+      </p:pic>
+      <p:pic>
+        <p:nvPicPr>
+          <p:cNvPr id="13" name="Graphic 12" descr="Cement truck outline">
+            <a:extLst>
+              <a:ext uri="{FF2B5EF4-FFF2-40B4-BE49-F238E27FC236}">
+                <a16:creationId xmlns:a16="http://schemas.microsoft.com/office/drawing/2014/main" id="{F3415A48-DC13-1025-7F37-DD31A7CB193D}"/>
+              </a:ext>
+            </a:extLst>
+          </p:cNvPr>
+          <p:cNvPicPr>
+            <a:picLocks noChangeAspect="1"/>
+          </p:cNvPicPr>
+          <p:nvPr/>
+        </p:nvPicPr>
+        <p:blipFill>
+          <a:blip r:embed="rId10">
+            <a:extLst>
+              <a:ext uri="{28A0092B-C50C-407E-A947-70E740481C1C}">
+                <a14:useLocalDpi xmlns:a14="http://schemas.microsoft.com/office/drawing/2010/main" val="0"/>
+              </a:ext>
+              <a:ext uri="{96DAC541-7B7A-43D3-8B79-37D633B846F1}">
+                <asvg:svgBlip xmlns:asvg="http://schemas.microsoft.com/office/drawing/2016/SVG/main" r:embed="rId11"/>
+              </a:ext>
+            </a:extLst>
+          </a:blip>
+          <a:stretch>
+            <a:fillRect/>
+          </a:stretch>
+        </p:blipFill>
+        <p:spPr>
+          <a:xfrm>
+            <a:off x="5393266" y="4580467"/>
+            <a:ext cx="2414324" cy="2414324"/>
+          </a:xfrm>
+          <a:prstGeom prst="rect">
+            <a:avLst/>
+          </a:prstGeom>
+        </p:spPr>
+      </p:pic>
+      <p:pic>
+        <p:nvPicPr>
+          <p:cNvPr id="4" name="Graphic 3">
+            <a:extLst>
+              <a:ext uri="{FF2B5EF4-FFF2-40B4-BE49-F238E27FC236}">
+                <a16:creationId xmlns:a16="http://schemas.microsoft.com/office/drawing/2014/main" id="{89F36F29-02BB-92B9-F74F-CF417E6C0293}"/>
+              </a:ext>
+            </a:extLst>
+          </p:cNvPr>
+          <p:cNvPicPr>
+            <a:picLocks noChangeAspect="1"/>
+          </p:cNvPicPr>
+          <p:nvPr/>
+        </p:nvPicPr>
+        <p:blipFill>
+          <a:blip r:embed="rId12">
+            <a:extLst>
+              <a:ext uri="{28A0092B-C50C-407E-A947-70E740481C1C}">
+                <a14:useLocalDpi xmlns:a14="http://schemas.microsoft.com/office/drawing/2010/main" val="0"/>
+              </a:ext>
+              <a:ext uri="{96DAC541-7B7A-43D3-8B79-37D633B846F1}">
+                <asvg:svgBlip xmlns:asvg="http://schemas.microsoft.com/office/drawing/2016/SVG/main" r:embed="rId13"/>
+              </a:ext>
+            </a:extLst>
+          </a:blip>
+          <a:stretch>
+            <a:fillRect/>
+          </a:stretch>
+        </p:blipFill>
+        <p:spPr>
+          <a:xfrm>
+            <a:off x="5425015" y="2200461"/>
+            <a:ext cx="2283090" cy="2435296"/>
+          </a:xfrm>
+          <a:prstGeom prst="rect">
+            <a:avLst/>
+          </a:prstGeom>
+        </p:spPr>
+      </p:pic>
+      <p:sp>
+        <p:nvSpPr>
+          <p:cNvPr id="6" name="Arrow: Left 5">
+            <a:extLst>
+              <a:ext uri="{FF2B5EF4-FFF2-40B4-BE49-F238E27FC236}">
+                <a16:creationId xmlns:a16="http://schemas.microsoft.com/office/drawing/2014/main" id="{B11CC891-C940-807F-E176-54D2EE39735A}"/>
+              </a:ext>
+            </a:extLst>
+          </p:cNvPr>
+          <p:cNvSpPr/>
+          <p:nvPr/>
+        </p:nvSpPr>
+        <p:spPr>
+          <a:xfrm rot="13925616">
+            <a:off x="3495845" y="2124029"/>
+            <a:ext cx="3173061" cy="878129"/>
+          </a:xfrm>
+          <a:prstGeom prst="leftArrow">
+            <a:avLst/>
+          </a:prstGeom>
+        </p:spPr>
+        <p:style>
+          <a:lnRef idx="2">
+            <a:schemeClr val="accent4">
+              <a:shade val="15000"/>
+            </a:schemeClr>
+          </a:lnRef>
+          <a:fillRef idx="1">
+            <a:schemeClr val="accent4"/>
+          </a:fillRef>
+          <a:effectRef idx="0">
+            <a:schemeClr val="accent4"/>
+          </a:effectRef>
+          <a:fontRef idx="minor">
+            <a:schemeClr val="lt1"/>
+          </a:fontRef>
+        </p:style>
+        <p:txBody>
+          <a:bodyPr rtlCol="0" anchor="ctr"/>
+          <a:lstStyle/>
+          <a:p>
+            <a:pPr algn="ctr"/>
+            <a:endParaRPr lang="en-US"/>
+          </a:p>
+        </p:txBody>
+      </p:sp>
+      <p:sp>
+        <p:nvSpPr>
+          <p:cNvPr id="8" name="Arrow: Left 7">
+            <a:extLst>
+              <a:ext uri="{FF2B5EF4-FFF2-40B4-BE49-F238E27FC236}">
+                <a16:creationId xmlns:a16="http://schemas.microsoft.com/office/drawing/2014/main" id="{417DAE2D-5881-1070-EEFE-55DAFAB0D460}"/>
+              </a:ext>
+            </a:extLst>
+          </p:cNvPr>
+          <p:cNvSpPr/>
+          <p:nvPr/>
+        </p:nvSpPr>
+        <p:spPr>
+          <a:xfrm rot="12947805">
+            <a:off x="6518683" y="1693037"/>
+            <a:ext cx="2914698" cy="878129"/>
+          </a:xfrm>
+          <a:prstGeom prst="leftArrow">
+            <a:avLst/>
+          </a:prstGeom>
+        </p:spPr>
+        <p:style>
+          <a:lnRef idx="2">
+            <a:schemeClr val="accent4">
+              <a:shade val="15000"/>
+            </a:schemeClr>
+          </a:lnRef>
+          <a:fillRef idx="1">
+            <a:schemeClr val="accent4"/>
+          </a:fillRef>
+          <a:effectRef idx="0">
+            <a:schemeClr val="accent4"/>
+          </a:effectRef>
+          <a:fontRef idx="minor">
+            <a:schemeClr val="lt1"/>
+          </a:fontRef>
+        </p:style>
+        <p:txBody>
+          <a:bodyPr rtlCol="0" anchor="ctr"/>
+          <a:lstStyle/>
+          <a:p>
+            <a:pPr algn="ctr"/>
+            <a:endParaRPr lang="en-US"/>
+          </a:p>
+        </p:txBody>
+      </p:sp>
+      <p:sp>
+        <p:nvSpPr>
+          <p:cNvPr id="10" name="Arrow: Left 9">
+            <a:extLst>
+              <a:ext uri="{FF2B5EF4-FFF2-40B4-BE49-F238E27FC236}">
+                <a16:creationId xmlns:a16="http://schemas.microsoft.com/office/drawing/2014/main" id="{CF9B646C-D855-FD68-AE2D-307B5C56561D}"/>
+              </a:ext>
+            </a:extLst>
+          </p:cNvPr>
+          <p:cNvSpPr/>
+          <p:nvPr/>
+        </p:nvSpPr>
+        <p:spPr>
+          <a:xfrm rot="14168450">
+            <a:off x="5657916" y="3017014"/>
+            <a:ext cx="5157376" cy="878129"/>
+          </a:xfrm>
+          <a:prstGeom prst="leftArrow">
+            <a:avLst/>
+          </a:prstGeom>
+        </p:spPr>
+        <p:style>
+          <a:lnRef idx="2">
+            <a:schemeClr val="accent4">
+              <a:shade val="15000"/>
+            </a:schemeClr>
+          </a:lnRef>
+          <a:fillRef idx="1">
+            <a:schemeClr val="accent4"/>
+          </a:fillRef>
+          <a:effectRef idx="0">
+            <a:schemeClr val="accent4"/>
+          </a:effectRef>
+          <a:fontRef idx="minor">
+            <a:schemeClr val="lt1"/>
+          </a:fontRef>
+        </p:style>
+        <p:txBody>
+          <a:bodyPr rtlCol="0" anchor="ctr"/>
+          <a:lstStyle/>
+          <a:p>
+            <a:pPr algn="ctr"/>
+            <a:endParaRPr lang="en-US"/>
+          </a:p>
+        </p:txBody>
+      </p:sp>
+    </p:spTree>
+    <p:extLst>
+      <p:ext uri="{BB962C8B-B14F-4D97-AF65-F5344CB8AC3E}">
+        <p14:creationId xmlns:p14="http://schemas.microsoft.com/office/powerpoint/2010/main" val="721622292"/>
+      </p:ext>
+    </p:extLst>
+  </p:cSld>
+  <p:clrMapOvr>
+    <a:masterClrMapping/>
+  </p:clrMapOvr>
+</p:sld>
+</file>
+
+<file path=ppt/slides/slide18.xml><?xml version="1.0" encoding="utf-8"?>
+<p:sld xmlns:a="http://schemas.openxmlformats.org/drawingml/2006/main" xmlns:r="http://schemas.openxmlformats.org/officeDocument/2006/relationships" xmlns:p="http://schemas.openxmlformats.org/presentationml/2006/main">
+  <p:cSld>
+    <p:spTree>
+      <p:nvGrpSpPr>
+        <p:cNvPr id="1" name=""/>
+        <p:cNvGrpSpPr/>
+        <p:nvPr/>
+      </p:nvGrpSpPr>
+      <p:grpSpPr>
+        <a:xfrm>
+          <a:off x="0" y="0"/>
+          <a:ext cx="0" cy="0"/>
+          <a:chOff x="0" y="0"/>
+          <a:chExt cx="0" cy="0"/>
+        </a:xfrm>
+      </p:grpSpPr>
+      <p:sp>
+        <p:nvSpPr>
+          <p:cNvPr id="2" name="Title 1">
+            <a:extLst>
+              <a:ext uri="{FF2B5EF4-FFF2-40B4-BE49-F238E27FC236}">
+                <a16:creationId xmlns:a16="http://schemas.microsoft.com/office/drawing/2014/main" id="{2B6ED295-9778-D383-102A-603496DC78FF}"/>
+              </a:ext>
+            </a:extLst>
+          </p:cNvPr>
+          <p:cNvSpPr>
+            <a:spLocks noGrp="1"/>
+          </p:cNvSpPr>
+          <p:nvPr>
+            <p:ph type="title"/>
+          </p:nvPr>
+        </p:nvSpPr>
+        <p:spPr/>
+        <p:txBody>
+          <a:bodyPr/>
+          <a:lstStyle/>
+          <a:p>
+            <a:r>
+              <a:rPr lang="en-US" dirty="0"/>
+              <a:t>Pre-training vs fine tuning</a:t>
+            </a:r>
+          </a:p>
+        </p:txBody>
+      </p:sp>
+      <p:sp>
+        <p:nvSpPr>
+          <p:cNvPr id="3" name="Content Placeholder 2">
+            <a:extLst>
+              <a:ext uri="{FF2B5EF4-FFF2-40B4-BE49-F238E27FC236}">
+                <a16:creationId xmlns:a16="http://schemas.microsoft.com/office/drawing/2014/main" id="{2846BE8F-BB45-0428-13FE-A221A925F18B}"/>
+              </a:ext>
+            </a:extLst>
+          </p:cNvPr>
+          <p:cNvSpPr>
+            <a:spLocks noGrp="1"/>
+          </p:cNvSpPr>
+          <p:nvPr>
+            <p:ph idx="1"/>
+          </p:nvPr>
+        </p:nvSpPr>
+        <p:spPr/>
+        <p:txBody>
+          <a:bodyPr/>
+          <a:lstStyle/>
+          <a:p>
+            <a:r>
+              <a:rPr lang="en-US" dirty="0"/>
+              <a:t>Pre-training:</a:t>
+            </a:r>
+          </a:p>
+          <a:p>
+            <a:pPr lvl="1"/>
+            <a:r>
+              <a:rPr lang="en-US" dirty="0"/>
+              <a:t>First phase of language modeling</a:t>
+            </a:r>
+          </a:p>
+          <a:p>
+            <a:pPr lvl="1"/>
+            <a:r>
+              <a:rPr lang="en-US" dirty="0"/>
+              <a:t>Learning from massive amount of unlabeled data (fill in the blanks)</a:t>
+            </a:r>
+          </a:p>
+          <a:p>
+            <a:pPr lvl="1"/>
+            <a:r>
+              <a:rPr lang="en-US" dirty="0"/>
+              <a:t>No specific task yet, but learning about human language generally</a:t>
+            </a:r>
+          </a:p>
+          <a:p>
+            <a:r>
+              <a:rPr lang="en-US" dirty="0"/>
+              <a:t>Fine-tuning</a:t>
+            </a:r>
+          </a:p>
+          <a:p>
+            <a:pPr lvl="1"/>
+            <a:r>
+              <a:rPr lang="en-US" dirty="0"/>
+              <a:t>Using a “base” or “generic” model from pre-training, optimization for a task or domain</a:t>
+            </a:r>
+          </a:p>
+          <a:p>
+            <a:pPr lvl="1"/>
+            <a:r>
+              <a:rPr lang="en-US" dirty="0"/>
+              <a:t>Otherwise stated, turning a high-octane fill-in-the-blanks into: </a:t>
+            </a:r>
+          </a:p>
+          <a:p>
+            <a:pPr lvl="2"/>
+            <a:r>
+              <a:rPr lang="en-US" dirty="0"/>
+              <a:t>spam classification, medical information extraction, chart summary, </a:t>
+            </a:r>
+            <a:r>
+              <a:rPr lang="en-US" dirty="0" err="1"/>
+              <a:t>etc</a:t>
+            </a:r>
+            <a:endParaRPr lang="en-US" dirty="0"/>
+          </a:p>
+          <a:p>
+            <a:pPr lvl="1"/>
+            <a:r>
+              <a:rPr lang="en-US" dirty="0"/>
+              <a:t>This is often done once you have labels (aka “supervised learning”)</a:t>
+            </a:r>
+          </a:p>
+        </p:txBody>
+      </p:sp>
+    </p:spTree>
+    <p:extLst>
+      <p:ext uri="{BB962C8B-B14F-4D97-AF65-F5344CB8AC3E}">
+        <p14:creationId xmlns:p14="http://schemas.microsoft.com/office/powerpoint/2010/main" val="3935077567"/>
+      </p:ext>
+    </p:extLst>
+  </p:cSld>
+  <p:clrMapOvr>
+    <a:masterClrMapping/>
+  </p:clrMapOvr>
+</p:sld>
+</file>
+
+<file path=ppt/slides/slide19.xml><?xml version="1.0" encoding="utf-8"?>
+<p:sld xmlns:a="http://schemas.openxmlformats.org/drawingml/2006/main" xmlns:r="http://schemas.openxmlformats.org/officeDocument/2006/relationships" xmlns:p="http://schemas.openxmlformats.org/presentationml/2006/main">
+  <p:cSld>
+    <p:spTree>
+      <p:nvGrpSpPr>
+        <p:cNvPr id="1" name=""/>
+        <p:cNvGrpSpPr/>
+        <p:nvPr/>
+      </p:nvGrpSpPr>
+      <p:grpSpPr>
+        <a:xfrm>
+          <a:off x="0" y="0"/>
+          <a:ext cx="0" cy="0"/>
+          <a:chOff x="0" y="0"/>
+          <a:chExt cx="0" cy="0"/>
+        </a:xfrm>
+      </p:grpSpPr>
+      <p:pic>
+        <p:nvPicPr>
+          <p:cNvPr id="3074" name="Picture 2">
+            <a:extLst>
+              <a:ext uri="{FF2B5EF4-FFF2-40B4-BE49-F238E27FC236}">
+                <a16:creationId xmlns:a16="http://schemas.microsoft.com/office/drawing/2014/main" id="{0C4B5DAB-01CC-A833-E5D8-7ACC70471968}"/>
+              </a:ext>
+            </a:extLst>
+          </p:cNvPr>
+          <p:cNvPicPr>
+            <a:picLocks noGrp="1" noChangeAspect="1" noChangeArrowheads="1"/>
+          </p:cNvPicPr>
+          <p:nvPr>
+            <p:ph idx="1"/>
+          </p:nvPr>
+        </p:nvPicPr>
+        <p:blipFill>
+          <a:blip r:embed="rId2">
+            <a:extLst>
+              <a:ext uri="{28A0092B-C50C-407E-A947-70E740481C1C}">
+                <a14:useLocalDpi xmlns:a14="http://schemas.microsoft.com/office/drawing/2010/main" val="0"/>
+              </a:ext>
+            </a:extLst>
+          </a:blip>
+          <a:srcRect/>
+          <a:stretch>
+            <a:fillRect/>
+          </a:stretch>
+        </p:blipFill>
+        <p:spPr bwMode="auto">
+          <a:xfrm>
+            <a:off x="2054048" y="1363133"/>
+            <a:ext cx="9340209" cy="4707466"/>
+          </a:xfrm>
+          <a:prstGeom prst="rect">
+            <a:avLst/>
+          </a:prstGeom>
+          <a:solidFill>
+            <a:srgbClr val="FFFFFF">
+              <a:shade val="85000"/>
+            </a:srgbClr>
+          </a:solidFill>
+          <a:ln w="190500" cap="rnd">
+            <a:solidFill>
+              <a:srgbClr val="FFFFFF"/>
+            </a:solidFill>
+          </a:ln>
+          <a:effectLst>
+            <a:outerShdw blurRad="50000" algn="tl" rotWithShape="0">
+              <a:srgbClr val="000000">
+                <a:alpha val="41000"/>
+              </a:srgbClr>
+            </a:outerShdw>
+          </a:effectLst>
+          <a:scene3d>
+            <a:camera prst="orthographicFront"/>
+            <a:lightRig rig="twoPt" dir="t">
+              <a:rot lat="0" lon="0" rev="7800000"/>
+            </a:lightRig>
+          </a:scene3d>
+          <a:sp3d contourW="6350">
+            <a:bevelT w="50800" h="16510"/>
+            <a:contourClr>
+              <a:srgbClr val="C0C0C0"/>
+            </a:contourClr>
+          </a:sp3d>
+          <a:extLst>
+            <a:ext uri="{909E8E84-426E-40DD-AFC4-6F175D3DCCD1}">
+              <a14:hiddenFill xmlns:a14="http://schemas.microsoft.com/office/drawing/2010/main">
+                <a:solidFill>
+                  <a:srgbClr val="FFFFFF"/>
+                </a:solidFill>
+              </a14:hiddenFill>
+            </a:ext>
+          </a:extLst>
+        </p:spPr>
+      </p:pic>
+      <p:sp>
+        <p:nvSpPr>
+          <p:cNvPr id="4" name="Title 1">
+            <a:extLst>
+              <a:ext uri="{FF2B5EF4-FFF2-40B4-BE49-F238E27FC236}">
+                <a16:creationId xmlns:a16="http://schemas.microsoft.com/office/drawing/2014/main" id="{DD9C931F-E866-5824-27EA-97DABF7E0704}"/>
+              </a:ext>
+            </a:extLst>
+          </p:cNvPr>
+          <p:cNvSpPr>
+            <a:spLocks noGrp="1"/>
+          </p:cNvSpPr>
+          <p:nvPr>
+            <p:ph type="title"/>
+          </p:nvPr>
+        </p:nvSpPr>
+        <p:spPr>
+          <a:xfrm>
+            <a:off x="2592925" y="624110"/>
+            <a:ext cx="8911687" cy="1280890"/>
+          </a:xfrm>
+        </p:spPr>
+        <p:txBody>
+          <a:bodyPr/>
+          <a:lstStyle/>
+          <a:p>
+            <a:r>
+              <a:rPr lang="en-US" dirty="0"/>
+              <a:t>An imperfect, but helpful  sketch</a:t>
+            </a:r>
+          </a:p>
+        </p:txBody>
+      </p:sp>
+      <p:sp>
+        <p:nvSpPr>
+          <p:cNvPr id="5" name="TextBox 4">
+            <a:extLst>
+              <a:ext uri="{FF2B5EF4-FFF2-40B4-BE49-F238E27FC236}">
+                <a16:creationId xmlns:a16="http://schemas.microsoft.com/office/drawing/2014/main" id="{7932F7A5-7D92-34D5-7E38-B04E908E0915}"/>
+              </a:ext>
+            </a:extLst>
+          </p:cNvPr>
+          <p:cNvSpPr txBox="1"/>
+          <p:nvPr/>
+        </p:nvSpPr>
+        <p:spPr>
+          <a:xfrm>
+            <a:off x="1380067" y="6282267"/>
+            <a:ext cx="10481733" cy="338554"/>
+          </a:xfrm>
+          <a:prstGeom prst="rect">
+            <a:avLst/>
+          </a:prstGeom>
+          <a:noFill/>
+        </p:spPr>
+        <p:txBody>
+          <a:bodyPr wrap="square" rtlCol="0">
+            <a:spAutoFit/>
+          </a:bodyPr>
+          <a:lstStyle/>
+          <a:p>
+            <a:r>
+              <a:rPr lang="en-US" sz="1600" dirty="0"/>
+              <a:t>Source: </a:t>
+            </a:r>
+            <a:r>
+              <a:rPr lang="en-US" sz="1600" dirty="0">
+                <a:hlinkClick r:id="rId3"/>
+              </a:rPr>
+              <a:t>https://medium.com/mantisnlp/supervised-fine-tuning-customizing-llms-a2c1edbf22c3</a:t>
+            </a:r>
+            <a:endParaRPr lang="en-US" sz="1600" dirty="0"/>
+          </a:p>
+        </p:txBody>
+      </p:sp>
+      <p:sp>
+        <p:nvSpPr>
+          <p:cNvPr id="7" name="Rectangle 6">
+            <a:extLst>
+              <a:ext uri="{FF2B5EF4-FFF2-40B4-BE49-F238E27FC236}">
+                <a16:creationId xmlns:a16="http://schemas.microsoft.com/office/drawing/2014/main" id="{0AF68563-7F56-796E-8BC8-B869B1EE5974}"/>
+              </a:ext>
+            </a:extLst>
+          </p:cNvPr>
+          <p:cNvSpPr/>
+          <p:nvPr/>
+        </p:nvSpPr>
+        <p:spPr>
+          <a:xfrm>
+            <a:off x="6477000" y="2785533"/>
+            <a:ext cx="2921000" cy="643467"/>
+          </a:xfrm>
+          <a:prstGeom prst="rect">
+            <a:avLst/>
+          </a:prstGeom>
+        </p:spPr>
+        <p:style>
+          <a:lnRef idx="2">
+            <a:schemeClr val="accent6"/>
+          </a:lnRef>
+          <a:fillRef idx="1">
+            <a:schemeClr val="lt1"/>
+          </a:fillRef>
+          <a:effectRef idx="0">
+            <a:schemeClr val="accent6"/>
+          </a:effectRef>
+          <a:fontRef idx="minor">
+            <a:schemeClr val="dk1"/>
+          </a:fontRef>
+        </p:style>
+        <p:txBody>
+          <a:bodyPr rtlCol="0" anchor="ctr"/>
+          <a:lstStyle/>
+          <a:p>
+            <a:pPr algn="ctr"/>
+            <a:r>
+              <a:rPr lang="en-US" dirty="0"/>
+              <a:t>Knowledge or labels</a:t>
+            </a:r>
+          </a:p>
+        </p:txBody>
+      </p:sp>
+    </p:spTree>
+    <p:extLst>
+      <p:ext uri="{BB962C8B-B14F-4D97-AF65-F5344CB8AC3E}">
+        <p14:creationId xmlns:p14="http://schemas.microsoft.com/office/powerpoint/2010/main" val="3044703512"/>
+      </p:ext>
+    </p:extLst>
+  </p:cSld>
+  <p:clrMapOvr>
+    <a:masterClrMapping/>
+  </p:clrMapOvr>
+</p:sld>
+</file>
+
 <file path=ppt/slides/slide2.xml><?xml version="1.0" encoding="utf-8"?>
 <p:sld xmlns:a="http://schemas.openxmlformats.org/drawingml/2006/main" xmlns:r="http://schemas.openxmlformats.org/officeDocument/2006/relationships" xmlns:p="http://schemas.openxmlformats.org/presentationml/2006/main">
   <p:cSld>
@@ -7898,6 +10083,265 @@
     <p:extLst>
       <p:ext uri="{BB962C8B-B14F-4D97-AF65-F5344CB8AC3E}">
         <p14:creationId xmlns:p14="http://schemas.microsoft.com/office/powerpoint/2010/main" val="918016351"/>
+      </p:ext>
+    </p:extLst>
+  </p:cSld>
+  <p:clrMapOvr>
+    <a:masterClrMapping/>
+  </p:clrMapOvr>
+</p:sld>
+</file>
+
+<file path=ppt/slides/slide20.xml><?xml version="1.0" encoding="utf-8"?>
+<p:sld xmlns:a="http://schemas.openxmlformats.org/drawingml/2006/main" xmlns:r="http://schemas.openxmlformats.org/officeDocument/2006/relationships" xmlns:p="http://schemas.openxmlformats.org/presentationml/2006/main">
+  <p:cSld>
+    <p:spTree>
+      <p:nvGrpSpPr>
+        <p:cNvPr id="1" name=""/>
+        <p:cNvGrpSpPr/>
+        <p:nvPr/>
+      </p:nvGrpSpPr>
+      <p:grpSpPr>
+        <a:xfrm>
+          <a:off x="0" y="0"/>
+          <a:ext cx="0" cy="0"/>
+          <a:chOff x="0" y="0"/>
+          <a:chExt cx="0" cy="0"/>
+        </a:xfrm>
+      </p:grpSpPr>
+      <p:sp>
+        <p:nvSpPr>
+          <p:cNvPr id="2" name="Title 1">
+            <a:extLst>
+              <a:ext uri="{FF2B5EF4-FFF2-40B4-BE49-F238E27FC236}">
+                <a16:creationId xmlns:a16="http://schemas.microsoft.com/office/drawing/2014/main" id="{71768A8B-4A93-E4EE-8799-6393E2804526}"/>
+              </a:ext>
+            </a:extLst>
+          </p:cNvPr>
+          <p:cNvSpPr>
+            <a:spLocks noGrp="1"/>
+          </p:cNvSpPr>
+          <p:nvPr>
+            <p:ph type="title"/>
+          </p:nvPr>
+        </p:nvSpPr>
+        <p:spPr/>
+        <p:txBody>
+          <a:bodyPr/>
+          <a:lstStyle/>
+          <a:p>
+            <a:r>
+              <a:rPr lang="en-US" dirty="0"/>
+              <a:t>Hands On: Pre-training and fine-tuning</a:t>
+            </a:r>
+          </a:p>
+        </p:txBody>
+      </p:sp>
+      <p:sp>
+        <p:nvSpPr>
+          <p:cNvPr id="3" name="Content Placeholder 2">
+            <a:extLst>
+              <a:ext uri="{FF2B5EF4-FFF2-40B4-BE49-F238E27FC236}">
+                <a16:creationId xmlns:a16="http://schemas.microsoft.com/office/drawing/2014/main" id="{132ADA8C-BBBE-AEF0-4399-ABA9241B6FF2}"/>
+              </a:ext>
+            </a:extLst>
+          </p:cNvPr>
+          <p:cNvSpPr>
+            <a:spLocks noGrp="1"/>
+          </p:cNvSpPr>
+          <p:nvPr>
+            <p:ph idx="1"/>
+          </p:nvPr>
+        </p:nvSpPr>
+        <p:spPr/>
+        <p:txBody>
+          <a:bodyPr/>
+          <a:lstStyle/>
+          <a:p>
+            <a:r>
+              <a:rPr lang="en-US" dirty="0"/>
+              <a:t>Now we’re going to work with some data and Python libraries for each of these</a:t>
+            </a:r>
+          </a:p>
+          <a:p>
+            <a:endParaRPr lang="en-US" dirty="0"/>
+          </a:p>
+          <a:p>
+            <a:r>
+              <a:rPr lang="en-US" dirty="0"/>
+              <a:t>A bit of orientation to some of the packages we will use:</a:t>
+            </a:r>
+          </a:p>
+          <a:p>
+            <a:pPr lvl="1"/>
+            <a:r>
+              <a:rPr lang="en-US" dirty="0" err="1"/>
+              <a:t>PyTorch</a:t>
+            </a:r>
+            <a:r>
+              <a:rPr lang="en-US" dirty="0"/>
+              <a:t>: Lower-level package for neural networks</a:t>
+            </a:r>
+          </a:p>
+          <a:p>
+            <a:pPr lvl="1"/>
+            <a:r>
+              <a:rPr lang="en-US" dirty="0" err="1"/>
+              <a:t>HuggingFace</a:t>
+            </a:r>
+            <a:r>
+              <a:rPr lang="en-US" dirty="0"/>
+              <a:t>: Applied use of </a:t>
+            </a:r>
+            <a:r>
+              <a:rPr lang="en-US" dirty="0" err="1"/>
+              <a:t>PyTorch</a:t>
+            </a:r>
+            <a:r>
+              <a:rPr lang="en-US" dirty="0"/>
+              <a:t> for NLP and other tasks</a:t>
+            </a:r>
+          </a:p>
+          <a:p>
+            <a:pPr lvl="2"/>
+            <a:r>
+              <a:rPr lang="en-US" dirty="0"/>
+              <a:t>Not just code, </a:t>
+            </a:r>
+            <a:r>
+              <a:rPr lang="en-US" dirty="0" err="1"/>
+              <a:t>HuggingFace</a:t>
+            </a:r>
+            <a:r>
+              <a:rPr lang="en-US" dirty="0"/>
+              <a:t> hosts models</a:t>
+            </a:r>
+          </a:p>
+          <a:p>
+            <a:pPr lvl="2"/>
+            <a:r>
+              <a:rPr lang="en-US" dirty="0"/>
+              <a:t>This has allowed for more rapid application of LLMs and reproducible science</a:t>
+            </a:r>
+          </a:p>
+        </p:txBody>
+      </p:sp>
+    </p:spTree>
+    <p:extLst>
+      <p:ext uri="{BB962C8B-B14F-4D97-AF65-F5344CB8AC3E}">
+        <p14:creationId xmlns:p14="http://schemas.microsoft.com/office/powerpoint/2010/main" val="2245809978"/>
+      </p:ext>
+    </p:extLst>
+  </p:cSld>
+  <p:clrMapOvr>
+    <a:masterClrMapping/>
+  </p:clrMapOvr>
+</p:sld>
+</file>
+
+<file path=ppt/slides/slide21.xml><?xml version="1.0" encoding="utf-8"?>
+<p:sld xmlns:a="http://schemas.openxmlformats.org/drawingml/2006/main" xmlns:r="http://schemas.openxmlformats.org/officeDocument/2006/relationships" xmlns:p="http://schemas.openxmlformats.org/presentationml/2006/main">
+  <p:cSld>
+    <p:spTree>
+      <p:nvGrpSpPr>
+        <p:cNvPr id="1" name=""/>
+        <p:cNvGrpSpPr/>
+        <p:nvPr/>
+      </p:nvGrpSpPr>
+      <p:grpSpPr>
+        <a:xfrm>
+          <a:off x="0" y="0"/>
+          <a:ext cx="0" cy="0"/>
+          <a:chOff x="0" y="0"/>
+          <a:chExt cx="0" cy="0"/>
+        </a:xfrm>
+      </p:grpSpPr>
+      <p:sp>
+        <p:nvSpPr>
+          <p:cNvPr id="2" name="Title 1">
+            <a:extLst>
+              <a:ext uri="{FF2B5EF4-FFF2-40B4-BE49-F238E27FC236}">
+                <a16:creationId xmlns:a16="http://schemas.microsoft.com/office/drawing/2014/main" id="{A1DA2CAD-EF98-52A2-6E3E-8AE127F572BD}"/>
+              </a:ext>
+            </a:extLst>
+          </p:cNvPr>
+          <p:cNvSpPr>
+            <a:spLocks noGrp="1"/>
+          </p:cNvSpPr>
+          <p:nvPr>
+            <p:ph type="title"/>
+          </p:nvPr>
+        </p:nvSpPr>
+        <p:spPr/>
+        <p:txBody>
+          <a:bodyPr/>
+          <a:lstStyle/>
+          <a:p>
+            <a:r>
+              <a:rPr lang="en-US" dirty="0"/>
+              <a:t>Time to get into Google </a:t>
+            </a:r>
+            <a:r>
+              <a:rPr lang="en-US" dirty="0" err="1"/>
+              <a:t>Colab</a:t>
+            </a:r>
+            <a:endParaRPr lang="en-US" dirty="0"/>
+          </a:p>
+        </p:txBody>
+      </p:sp>
+      <p:pic>
+        <p:nvPicPr>
+          <p:cNvPr id="4098" name="Picture 2">
+            <a:extLst>
+              <a:ext uri="{FF2B5EF4-FFF2-40B4-BE49-F238E27FC236}">
+                <a16:creationId xmlns:a16="http://schemas.microsoft.com/office/drawing/2014/main" id="{CF67F638-C3C7-8CD1-B55C-B35373AE2D6A}"/>
+              </a:ext>
+            </a:extLst>
+          </p:cNvPr>
+          <p:cNvPicPr>
+            <a:picLocks noGrp="1" noChangeAspect="1" noChangeArrowheads="1"/>
+          </p:cNvPicPr>
+          <p:nvPr>
+            <p:ph idx="1"/>
+          </p:nvPr>
+        </p:nvPicPr>
+        <p:blipFill>
+          <a:blip r:embed="rId2">
+            <a:extLst>
+              <a:ext uri="{28A0092B-C50C-407E-A947-70E740481C1C}">
+                <a14:useLocalDpi xmlns:a14="http://schemas.microsoft.com/office/drawing/2010/main" val="0"/>
+              </a:ext>
+            </a:extLst>
+          </a:blip>
+          <a:srcRect/>
+          <a:stretch>
+            <a:fillRect/>
+          </a:stretch>
+        </p:blipFill>
+        <p:spPr bwMode="auto">
+          <a:xfrm>
+            <a:off x="2452158" y="3271308"/>
+            <a:ext cx="8554633" cy="1783292"/>
+          </a:xfrm>
+          <a:prstGeom prst="rect">
+            <a:avLst/>
+          </a:prstGeom>
+          <a:noFill/>
+          <a:extLst>
+            <a:ext uri="{909E8E84-426E-40DD-AFC4-6F175D3DCCD1}">
+              <a14:hiddenFill xmlns:a14="http://schemas.microsoft.com/office/drawing/2010/main">
+                <a:solidFill>
+                  <a:srgbClr val="FFFFFF"/>
+                </a:solidFill>
+              </a14:hiddenFill>
+            </a:ext>
+          </a:extLst>
+        </p:spPr>
+      </p:pic>
+    </p:spTree>
+    <p:extLst>
+      <p:ext uri="{BB962C8B-B14F-4D97-AF65-F5344CB8AC3E}">
+        <p14:creationId xmlns:p14="http://schemas.microsoft.com/office/powerpoint/2010/main" val="3231028318"/>
       </p:ext>
     </p:extLst>
   </p:cSld>
@@ -8906,10 +11350,354 @@
           </a:p>
         </p:txBody>
       </p:sp>
+      <p:sp>
+        <p:nvSpPr>
+          <p:cNvPr id="8" name="Flowchart: Magnetic Disk 7">
+            <a:extLst>
+              <a:ext uri="{FF2B5EF4-FFF2-40B4-BE49-F238E27FC236}">
+                <a16:creationId xmlns:a16="http://schemas.microsoft.com/office/drawing/2014/main" id="{200E8694-7FF3-A8A4-FDF9-268C78F9B50C}"/>
+              </a:ext>
+            </a:extLst>
+          </p:cNvPr>
+          <p:cNvSpPr/>
+          <p:nvPr/>
+        </p:nvSpPr>
+        <p:spPr>
+          <a:xfrm>
+            <a:off x="7394339" y="1906058"/>
+            <a:ext cx="3437467" cy="3911600"/>
+          </a:xfrm>
+          <a:prstGeom prst="flowChartMagneticDisk">
+            <a:avLst/>
+          </a:prstGeom>
+        </p:spPr>
+        <p:style>
+          <a:lnRef idx="2">
+            <a:schemeClr val="accent4">
+              <a:shade val="15000"/>
+            </a:schemeClr>
+          </a:lnRef>
+          <a:fillRef idx="1">
+            <a:schemeClr val="accent4"/>
+          </a:fillRef>
+          <a:effectRef idx="0">
+            <a:schemeClr val="accent4"/>
+          </a:effectRef>
+          <a:fontRef idx="minor">
+            <a:schemeClr val="lt1"/>
+          </a:fontRef>
+        </p:style>
+        <p:txBody>
+          <a:bodyPr rtlCol="0" anchor="ctr"/>
+          <a:lstStyle/>
+          <a:p>
+            <a:pPr algn="ctr"/>
+            <a:r>
+              <a:rPr lang="en-US" sz="2400" dirty="0"/>
+              <a:t>Transformer model</a:t>
+            </a:r>
+          </a:p>
+          <a:p>
+            <a:pPr algn="ctr"/>
+            <a:endParaRPr lang="en-US" sz="4000" dirty="0"/>
+          </a:p>
+          <a:p>
+            <a:pPr algn="ctr"/>
+            <a:r>
+              <a:rPr lang="en-US" sz="2400" dirty="0"/>
+              <a:t>(architecture for modern LLMs)</a:t>
+            </a:r>
+          </a:p>
+        </p:txBody>
+      </p:sp>
+      <p:sp>
+        <p:nvSpPr>
+          <p:cNvPr id="9" name="TextBox 8">
+            <a:extLst>
+              <a:ext uri="{FF2B5EF4-FFF2-40B4-BE49-F238E27FC236}">
+                <a16:creationId xmlns:a16="http://schemas.microsoft.com/office/drawing/2014/main" id="{ACF3120E-89A9-F5A3-CBE1-E3C4D74EADFE}"/>
+              </a:ext>
+            </a:extLst>
+          </p:cNvPr>
+          <p:cNvSpPr txBox="1"/>
+          <p:nvPr/>
+        </p:nvSpPr>
+        <p:spPr>
+          <a:xfrm>
+            <a:off x="7394339" y="6049224"/>
+            <a:ext cx="4340461" cy="646331"/>
+          </a:xfrm>
+          <a:prstGeom prst="rect">
+            <a:avLst/>
+          </a:prstGeom>
+          <a:noFill/>
+        </p:spPr>
+        <p:txBody>
+          <a:bodyPr wrap="square" rtlCol="0">
+            <a:spAutoFit/>
+          </a:bodyPr>
+          <a:lstStyle/>
+          <a:p>
+            <a:r>
+              <a:rPr lang="en-US" dirty="0"/>
+              <a:t>^^^ possible once we had</a:t>
+            </a:r>
+          </a:p>
+          <a:p>
+            <a:r>
+              <a:rPr lang="en-US" dirty="0"/>
+              <a:t>many labeled examples</a:t>
+            </a:r>
+          </a:p>
+        </p:txBody>
+      </p:sp>
     </p:spTree>
     <p:extLst>
       <p:ext uri="{BB962C8B-B14F-4D97-AF65-F5344CB8AC3E}">
         <p14:creationId xmlns:p14="http://schemas.microsoft.com/office/powerpoint/2010/main" val="2492400480"/>
+      </p:ext>
+    </p:extLst>
+  </p:cSld>
+  <p:clrMapOvr>
+    <a:masterClrMapping/>
+  </p:clrMapOvr>
+</p:sld>
+</file>
+
+<file path=ppt/slides/slide8.xml><?xml version="1.0" encoding="utf-8"?>
+<p:sld xmlns:a="http://schemas.openxmlformats.org/drawingml/2006/main" xmlns:r="http://schemas.openxmlformats.org/officeDocument/2006/relationships" xmlns:p="http://schemas.openxmlformats.org/presentationml/2006/main">
+  <p:cSld>
+    <p:spTree>
+      <p:nvGrpSpPr>
+        <p:cNvPr id="1" name=""/>
+        <p:cNvGrpSpPr/>
+        <p:nvPr/>
+      </p:nvGrpSpPr>
+      <p:grpSpPr>
+        <a:xfrm>
+          <a:off x="0" y="0"/>
+          <a:ext cx="0" cy="0"/>
+          <a:chOff x="0" y="0"/>
+          <a:chExt cx="0" cy="0"/>
+        </a:xfrm>
+      </p:grpSpPr>
+      <p:sp>
+        <p:nvSpPr>
+          <p:cNvPr id="2" name="Title 1">
+            <a:extLst>
+              <a:ext uri="{FF2B5EF4-FFF2-40B4-BE49-F238E27FC236}">
+                <a16:creationId xmlns:a16="http://schemas.microsoft.com/office/drawing/2014/main" id="{BF6D80F8-ED79-390F-2608-7F1BDBCE4E16}"/>
+              </a:ext>
+            </a:extLst>
+          </p:cNvPr>
+          <p:cNvSpPr>
+            <a:spLocks noGrp="1"/>
+          </p:cNvSpPr>
+          <p:nvPr>
+            <p:ph type="title"/>
+          </p:nvPr>
+        </p:nvSpPr>
+        <p:spPr/>
+        <p:txBody>
+          <a:bodyPr/>
+          <a:lstStyle/>
+          <a:p>
+            <a:r>
+              <a:rPr lang="en-US" dirty="0"/>
+              <a:t>LLMs are powerful in many NLP tasks</a:t>
+            </a:r>
+          </a:p>
+        </p:txBody>
+      </p:sp>
+      <p:sp>
+        <p:nvSpPr>
+          <p:cNvPr id="3" name="Content Placeholder 2">
+            <a:extLst>
+              <a:ext uri="{FF2B5EF4-FFF2-40B4-BE49-F238E27FC236}">
+                <a16:creationId xmlns:a16="http://schemas.microsoft.com/office/drawing/2014/main" id="{E22FBEAD-0FBE-8203-74D5-AE75E38A53A8}"/>
+              </a:ext>
+            </a:extLst>
+          </p:cNvPr>
+          <p:cNvSpPr>
+            <a:spLocks noGrp="1"/>
+          </p:cNvSpPr>
+          <p:nvPr>
+            <p:ph idx="1"/>
+          </p:nvPr>
+        </p:nvSpPr>
+        <p:spPr/>
+        <p:txBody>
+          <a:bodyPr>
+            <a:normAutofit/>
+          </a:bodyPr>
+          <a:lstStyle/>
+          <a:p>
+            <a:r>
+              <a:rPr lang="en-US" sz="3200" dirty="0"/>
+              <a:t>NLP is a field of many tasks:</a:t>
+            </a:r>
+          </a:p>
+          <a:p>
+            <a:pPr lvl="1"/>
+            <a:r>
+              <a:rPr lang="en-US" sz="3000" dirty="0"/>
+              <a:t>Classification (spam vs not spam)</a:t>
+            </a:r>
+          </a:p>
+          <a:p>
+            <a:pPr lvl="1"/>
+            <a:r>
+              <a:rPr lang="en-US" sz="3000" dirty="0"/>
+              <a:t>Information Retrieval (web searches)</a:t>
+            </a:r>
+          </a:p>
+          <a:p>
+            <a:pPr lvl="1"/>
+            <a:r>
+              <a:rPr lang="en-US" sz="3000" dirty="0"/>
+              <a:t>Text Generation (ChatGPT)</a:t>
+            </a:r>
+          </a:p>
+          <a:p>
+            <a:pPr lvl="1"/>
+            <a:r>
+              <a:rPr lang="en-US" sz="3000" dirty="0"/>
+              <a:t>Information Summary (ChatGPT)</a:t>
+            </a:r>
+          </a:p>
+          <a:p>
+            <a:r>
+              <a:rPr lang="en-US" sz="3200" dirty="0"/>
+              <a:t>We will come back to this…</a:t>
+            </a:r>
+          </a:p>
+        </p:txBody>
+      </p:sp>
+    </p:spTree>
+    <p:extLst>
+      <p:ext uri="{BB962C8B-B14F-4D97-AF65-F5344CB8AC3E}">
+        <p14:creationId xmlns:p14="http://schemas.microsoft.com/office/powerpoint/2010/main" val="457662514"/>
+      </p:ext>
+    </p:extLst>
+  </p:cSld>
+  <p:clrMapOvr>
+    <a:masterClrMapping/>
+  </p:clrMapOvr>
+</p:sld>
+</file>
+
+<file path=ppt/slides/slide9.xml><?xml version="1.0" encoding="utf-8"?>
+<p:sld xmlns:a="http://schemas.openxmlformats.org/drawingml/2006/main" xmlns:r="http://schemas.openxmlformats.org/officeDocument/2006/relationships" xmlns:p="http://schemas.openxmlformats.org/presentationml/2006/main">
+  <p:cSld>
+    <p:spTree>
+      <p:nvGrpSpPr>
+        <p:cNvPr id="1" name="">
+          <a:extLst>
+            <a:ext uri="{FF2B5EF4-FFF2-40B4-BE49-F238E27FC236}">
+              <a16:creationId xmlns:a16="http://schemas.microsoft.com/office/drawing/2014/main" id="{7BFEBF47-2433-0FB3-C910-311B09A244F6}"/>
+            </a:ext>
+          </a:extLst>
+        </p:cNvPr>
+        <p:cNvGrpSpPr/>
+        <p:nvPr/>
+      </p:nvGrpSpPr>
+      <p:grpSpPr>
+        <a:xfrm>
+          <a:off x="0" y="0"/>
+          <a:ext cx="0" cy="0"/>
+          <a:chOff x="0" y="0"/>
+          <a:chExt cx="0" cy="0"/>
+        </a:xfrm>
+      </p:grpSpPr>
+      <p:sp>
+        <p:nvSpPr>
+          <p:cNvPr id="2" name="Title 1">
+            <a:extLst>
+              <a:ext uri="{FF2B5EF4-FFF2-40B4-BE49-F238E27FC236}">
+                <a16:creationId xmlns:a16="http://schemas.microsoft.com/office/drawing/2014/main" id="{05D5129C-9967-2ACE-4119-C25FD676E549}"/>
+              </a:ext>
+            </a:extLst>
+          </p:cNvPr>
+          <p:cNvSpPr>
+            <a:spLocks noGrp="1"/>
+          </p:cNvSpPr>
+          <p:nvPr>
+            <p:ph type="title"/>
+          </p:nvPr>
+        </p:nvSpPr>
+        <p:spPr/>
+        <p:txBody>
+          <a:bodyPr/>
+          <a:lstStyle/>
+          <a:p>
+            <a:r>
+              <a:rPr lang="en-US" dirty="0"/>
+              <a:t>How are modern LLMs trained?</a:t>
+            </a:r>
+          </a:p>
+        </p:txBody>
+      </p:sp>
+      <p:sp>
+        <p:nvSpPr>
+          <p:cNvPr id="3" name="Content Placeholder 2">
+            <a:extLst>
+              <a:ext uri="{FF2B5EF4-FFF2-40B4-BE49-F238E27FC236}">
+                <a16:creationId xmlns:a16="http://schemas.microsoft.com/office/drawing/2014/main" id="{73E7B1FA-40B0-727A-7485-B284D7CFC441}"/>
+              </a:ext>
+            </a:extLst>
+          </p:cNvPr>
+          <p:cNvSpPr>
+            <a:spLocks noGrp="1"/>
+          </p:cNvSpPr>
+          <p:nvPr>
+            <p:ph idx="1"/>
+          </p:nvPr>
+        </p:nvSpPr>
+        <p:spPr/>
+        <p:txBody>
+          <a:bodyPr>
+            <a:normAutofit/>
+          </a:bodyPr>
+          <a:lstStyle/>
+          <a:p>
+            <a:r>
+              <a:rPr lang="en-US" sz="3200" dirty="0"/>
+              <a:t>Simple explanation is by filling in the blanks… many, many times…</a:t>
+            </a:r>
+          </a:p>
+          <a:p>
+            <a:endParaRPr lang="en-US" dirty="0"/>
+          </a:p>
+          <a:p>
+            <a:pPr marL="0" indent="0">
+              <a:buNone/>
+            </a:pPr>
+            <a:endParaRPr lang="en-US" dirty="0"/>
+          </a:p>
+          <a:p>
+            <a:pPr marL="0" indent="0">
+              <a:buNone/>
+            </a:pPr>
+            <a:r>
+              <a:rPr lang="en-US" sz="4000" dirty="0"/>
+              <a:t>“We know each other so well… </a:t>
+            </a:r>
+          </a:p>
+          <a:p>
+            <a:pPr marL="0" indent="0">
+              <a:buNone/>
+            </a:pPr>
+            <a:r>
+              <a:rPr lang="en-US" sz="4000" dirty="0"/>
+              <a:t>we finish each other’s __________”</a:t>
+            </a:r>
+          </a:p>
+        </p:txBody>
+      </p:sp>
+    </p:spTree>
+    <p:extLst>
+      <p:ext uri="{BB962C8B-B14F-4D97-AF65-F5344CB8AC3E}">
+        <p14:creationId xmlns:p14="http://schemas.microsoft.com/office/powerpoint/2010/main" val="4253893439"/>
       </p:ext>
     </p:extLst>
   </p:cSld>

</xml_diff>